<commit_message>
Update Presentasi Project UAS - PPDB SD.pptx
</commit_message>
<xml_diff>
--- a/Laporan dan Presentasi/Presentasi/Presentasi Project UAS - PPDB SD.pptx
+++ b/Laporan dan Presentasi/Presentasi/Presentasi Project UAS - PPDB SD.pptx
@@ -1,152 +1,51 @@
 
 <file path=ppt/presentation.xml><?xml version="1.0" encoding="utf-8"?>
-<p:presentation xmlns:a="http://schemas.openxmlformats.org/drawingml/2006/main" xmlns:r="http://schemas.openxmlformats.org/officeDocument/2006/relationships" xmlns:p="http://schemas.openxmlformats.org/presentationml/2006/main" saveSubsetFonts="1" embedTrueTypeFonts="true">
+<p:presentation xmlns:a="http://schemas.openxmlformats.org/drawingml/2006/main" xmlns:r="http://schemas.openxmlformats.org/officeDocument/2006/relationships" xmlns:p="http://schemas.openxmlformats.org/presentationml/2006/main" embedTrueTypeFonts="1" saveSubsetFonts="1">
   <p:sldMasterIdLst>
     <p:sldMasterId id="2147483648" r:id="rId1"/>
   </p:sldMasterIdLst>
   <p:sldIdLst>
-    <p:sldId id="256" r:id="rId38"/>
-    <p:sldId id="257" r:id="rId39"/>
-    <p:sldId id="258" r:id="rId40"/>
-    <p:sldId id="259" r:id="rId41"/>
-    <p:sldId id="260" r:id="rId42"/>
-    <p:sldId id="261" r:id="rId43"/>
-    <p:sldId id="262" r:id="rId44"/>
-    <p:sldId id="263" r:id="rId45"/>
-    <p:sldId id="264" r:id="rId46"/>
-    <p:sldId id="265" r:id="rId47"/>
-    <p:sldId id="266" r:id="rId48"/>
+    <p:sldId id="256" r:id="rId2"/>
+    <p:sldId id="257" r:id="rId3"/>
+    <p:sldId id="258" r:id="rId4"/>
+    <p:sldId id="259" r:id="rId5"/>
+    <p:sldId id="260" r:id="rId6"/>
+    <p:sldId id="261" r:id="rId7"/>
+    <p:sldId id="262" r:id="rId8"/>
+    <p:sldId id="263" r:id="rId9"/>
+    <p:sldId id="264" r:id="rId10"/>
+    <p:sldId id="265" r:id="rId11"/>
+    <p:sldId id="266" r:id="rId12"/>
   </p:sldIdLst>
   <p:sldSz cx="18288000" cy="10287000"/>
   <p:notesSz cx="6858000" cy="9144000"/>
   <p:embeddedFontLst>
     <p:embeddedFont>
-      <p:font typeface="Montserrat Classic" charset="1" panose="00000500000000000000"/>
-      <p:regular r:id="rId6"/>
+      <p:font typeface="Calibri" panose="020F0502020204030204" pitchFamily="34" charset="0"/>
+      <p:regular r:id="rId13"/>
+      <p:bold r:id="rId14"/>
+      <p:italic r:id="rId15"/>
+      <p:boldItalic r:id="rId16"/>
     </p:embeddedFont>
     <p:embeddedFont>
-      <p:font typeface="Montserrat Classic Bold" charset="1" panose="00000800000000000000"/>
-      <p:regular r:id="rId7"/>
-    </p:embeddedFont>
-    <p:embeddedFont>
-      <p:font typeface="Arimo" charset="1" panose="020B0604020202020204"/>
-      <p:regular r:id="rId8"/>
-    </p:embeddedFont>
-    <p:embeddedFont>
-      <p:font typeface="Arimo Bold" charset="1" panose="020B0704020202020204"/>
-      <p:regular r:id="rId9"/>
-    </p:embeddedFont>
-    <p:embeddedFont>
-      <p:font typeface="Arimo Italics" charset="1" panose="020B0604020202090204"/>
-      <p:regular r:id="rId10"/>
-    </p:embeddedFont>
-    <p:embeddedFont>
-      <p:font typeface="Arimo Bold Italics" charset="1" panose="020B0704020202090204"/>
-      <p:regular r:id="rId11"/>
-    </p:embeddedFont>
-    <p:embeddedFont>
-      <p:font typeface="Open Sans" charset="1" panose="020B0606030504020204"/>
-      <p:regular r:id="rId12"/>
-    </p:embeddedFont>
-    <p:embeddedFont>
-      <p:font typeface="Open Sans Bold" charset="1" panose="020B0806030504020204"/>
-      <p:regular r:id="rId13"/>
-    </p:embeddedFont>
-    <p:embeddedFont>
-      <p:font typeface="Open Sans Italics" charset="1" panose="020B0606030504020204"/>
-      <p:regular r:id="rId14"/>
-    </p:embeddedFont>
-    <p:embeddedFont>
-      <p:font typeface="Open Sans Bold Italics" charset="1" panose="020B0806030504020204"/>
-      <p:regular r:id="rId15"/>
-    </p:embeddedFont>
-    <p:embeddedFont>
-      <p:font typeface="Open Sans Light" charset="1" panose="020B0306030504020204"/>
-      <p:regular r:id="rId16"/>
-    </p:embeddedFont>
-    <p:embeddedFont>
-      <p:font typeface="Open Sans Light Italics" charset="1" panose="020B0306030504020204"/>
+      <p:font typeface="Montserrat Classic" panose="020B0604020202020204" charset="0"/>
       <p:regular r:id="rId17"/>
     </p:embeddedFont>
     <p:embeddedFont>
-      <p:font typeface="Open Sans Ultra-Bold" charset="1" panose="00000000000000000000"/>
+      <p:font typeface="Montserrat Classic Bold" panose="020B0604020202020204" charset="0"/>
       <p:regular r:id="rId18"/>
     </p:embeddedFont>
     <p:embeddedFont>
-      <p:font typeface="Open Sans Ultra-Bold Italics" charset="1" panose="00000000000000000000"/>
+      <p:font typeface="Montserrat Heavy" panose="020B0604020202020204" charset="0"/>
       <p:regular r:id="rId19"/>
     </p:embeddedFont>
     <p:embeddedFont>
-      <p:font typeface="Montserrat" charset="1" panose="00000500000000000000"/>
+      <p:font typeface="Montserrat Ultra-Bold" panose="020B0604020202020204" charset="0"/>
       <p:regular r:id="rId20"/>
     </p:embeddedFont>
     <p:embeddedFont>
-      <p:font typeface="Montserrat Bold" charset="1" panose="00000800000000000000"/>
+      <p:font typeface="Open Sans" panose="020B0606030504020204" pitchFamily="34" charset="0"/>
       <p:regular r:id="rId21"/>
-    </p:embeddedFont>
-    <p:embeddedFont>
-      <p:font typeface="Montserrat Italics" charset="1" panose="00000500000000000000"/>
-      <p:regular r:id="rId22"/>
-    </p:embeddedFont>
-    <p:embeddedFont>
-      <p:font typeface="Montserrat Bold Italics" charset="1" panose="00000800000000000000"/>
-      <p:regular r:id="rId23"/>
-    </p:embeddedFont>
-    <p:embeddedFont>
-      <p:font typeface="Montserrat Thin" charset="1" panose="00000300000000000000"/>
-      <p:regular r:id="rId24"/>
-    </p:embeddedFont>
-    <p:embeddedFont>
-      <p:font typeface="Montserrat Thin Italics" charset="1" panose="00000300000000000000"/>
-      <p:regular r:id="rId25"/>
-    </p:embeddedFont>
-    <p:embeddedFont>
-      <p:font typeface="Montserrat Extra-Light" charset="1" panose="00000300000000000000"/>
-      <p:regular r:id="rId26"/>
-    </p:embeddedFont>
-    <p:embeddedFont>
-      <p:font typeface="Montserrat Extra-Light Italics" charset="1" panose="00000300000000000000"/>
-      <p:regular r:id="rId27"/>
-    </p:embeddedFont>
-    <p:embeddedFont>
-      <p:font typeface="Montserrat Light" charset="1" panose="00000400000000000000"/>
-      <p:regular r:id="rId28"/>
-    </p:embeddedFont>
-    <p:embeddedFont>
-      <p:font typeface="Montserrat Light Italics" charset="1" panose="00000400000000000000"/>
-      <p:regular r:id="rId29"/>
-    </p:embeddedFont>
-    <p:embeddedFont>
-      <p:font typeface="Montserrat Medium" charset="1" panose="00000600000000000000"/>
-      <p:regular r:id="rId30"/>
-    </p:embeddedFont>
-    <p:embeddedFont>
-      <p:font typeface="Montserrat Medium Italics" charset="1" panose="00000600000000000000"/>
-      <p:regular r:id="rId31"/>
-    </p:embeddedFont>
-    <p:embeddedFont>
-      <p:font typeface="Montserrat Semi-Bold" charset="1" panose="00000700000000000000"/>
-      <p:regular r:id="rId32"/>
-    </p:embeddedFont>
-    <p:embeddedFont>
-      <p:font typeface="Montserrat Semi-Bold Italics" charset="1" panose="00000700000000000000"/>
-      <p:regular r:id="rId33"/>
-    </p:embeddedFont>
-    <p:embeddedFont>
-      <p:font typeface="Montserrat Ultra-Bold" charset="1" panose="00000900000000000000"/>
-      <p:regular r:id="rId34"/>
-    </p:embeddedFont>
-    <p:embeddedFont>
-      <p:font typeface="Montserrat Ultra-Bold Italics" charset="1" panose="00000900000000000000"/>
-      <p:regular r:id="rId35"/>
-    </p:embeddedFont>
-    <p:embeddedFont>
-      <p:font typeface="Montserrat Heavy" charset="1" panose="00000A00000000000000"/>
-      <p:regular r:id="rId36"/>
-    </p:embeddedFont>
-    <p:embeddedFont>
-      <p:font typeface="Montserrat Heavy Italics" charset="1" panose="00000A00000000000000"/>
-      <p:regular r:id="rId37"/>
     </p:embeddedFont>
   </p:embeddedFontLst>
   <p:defaultTextStyle>
@@ -244,6 +143,22 @@
       </a:defRPr>
     </a:lvl9pPr>
   </p:defaultTextStyle>
+  <p:extLst>
+    <p:ext uri="{EFAFB233-063F-42B5-8137-9DF3F51BA10A}">
+      <p15:sldGuideLst xmlns:p15="http://schemas.microsoft.com/office/powerpoint/2012/main">
+        <p15:guide id="1" orient="horz" pos="2160">
+          <p15:clr>
+            <a:srgbClr val="A4A3A4"/>
+          </p15:clr>
+        </p15:guide>
+        <p15:guide id="2" pos="2880">
+          <p15:clr>
+            <a:srgbClr val="A4A3A4"/>
+          </p15:clr>
+        </p15:guide>
+      </p15:sldGuideLst>
+    </p:ext>
+  </p:extLst>
 </p:presentation>
 </file>
 
@@ -285,10 +200,9 @@
           <a:lstStyle/>
           <a:p>
             <a:r>
-              <a:rPr lang="en-US" smtClean="0"/>
+              <a:rPr lang="en-US"/>
               <a:t>Click to edit Master title style</a:t>
             </a:r>
-            <a:endParaRPr lang="en-US"/>
           </a:p>
         </p:txBody>
       </p:sp>
@@ -404,10 +318,9 @@
           </a:lstStyle>
           <a:p>
             <a:r>
-              <a:rPr lang="en-US" smtClean="0"/>
+              <a:rPr lang="en-US"/>
               <a:t>Click to edit Master subtitle style</a:t>
             </a:r>
-            <a:endParaRPr lang="en-US"/>
           </a:p>
         </p:txBody>
       </p:sp>
@@ -429,7 +342,7 @@
             <a:fld id="{1D8BD707-D9CF-40AE-B4C6-C98DA3205C09}" type="datetimeFigureOut">
               <a:rPr lang="en-US" smtClean="0"/>
               <a:pPr/>
-              <a:t>8/1/2011</a:t>
+              <a:t>1/3/2024</a:t>
             </a:fld>
             <a:endParaRPr lang="en-US"/>
           </a:p>
@@ -519,10 +432,9 @@
           <a:lstStyle/>
           <a:p>
             <a:r>
-              <a:rPr lang="en-US" smtClean="0"/>
+              <a:rPr lang="en-US"/>
               <a:t>Click to edit Master title style</a:t>
             </a:r>
-            <a:endParaRPr lang="en-US"/>
           </a:p>
         </p:txBody>
       </p:sp>
@@ -543,38 +455,37 @@
           <a:p>
             <a:pPr lvl="0"/>
             <a:r>
-              <a:rPr lang="en-US" smtClean="0"/>
+              <a:rPr lang="en-US"/>
               <a:t>Click to edit Master text styles</a:t>
             </a:r>
           </a:p>
           <a:p>
             <a:pPr lvl="1"/>
             <a:r>
-              <a:rPr lang="en-US" smtClean="0"/>
+              <a:rPr lang="en-US"/>
               <a:t>Second level</a:t>
             </a:r>
           </a:p>
           <a:p>
             <a:pPr lvl="2"/>
             <a:r>
-              <a:rPr lang="en-US" smtClean="0"/>
+              <a:rPr lang="en-US"/>
               <a:t>Third level</a:t>
             </a:r>
           </a:p>
           <a:p>
             <a:pPr lvl="3"/>
             <a:r>
-              <a:rPr lang="en-US" smtClean="0"/>
+              <a:rPr lang="en-US"/>
               <a:t>Fourth level</a:t>
             </a:r>
           </a:p>
           <a:p>
             <a:pPr lvl="4"/>
             <a:r>
-              <a:rPr lang="en-US" smtClean="0"/>
+              <a:rPr lang="en-US"/>
               <a:t>Fifth level</a:t>
             </a:r>
-            <a:endParaRPr lang="en-US"/>
           </a:p>
         </p:txBody>
       </p:sp>
@@ -596,7 +507,7 @@
             <a:fld id="{1D8BD707-D9CF-40AE-B4C6-C98DA3205C09}" type="datetimeFigureOut">
               <a:rPr lang="en-US" smtClean="0"/>
               <a:pPr/>
-              <a:t>8/1/2011</a:t>
+              <a:t>1/3/2024</a:t>
             </a:fld>
             <a:endParaRPr lang="en-US"/>
           </a:p>
@@ -691,10 +602,9 @@
           <a:lstStyle/>
           <a:p>
             <a:r>
-              <a:rPr lang="en-US" smtClean="0"/>
+              <a:rPr lang="en-US"/>
               <a:t>Click to edit Master title style</a:t>
             </a:r>
-            <a:endParaRPr lang="en-US"/>
           </a:p>
         </p:txBody>
       </p:sp>
@@ -720,38 +630,37 @@
           <a:p>
             <a:pPr lvl="0"/>
             <a:r>
-              <a:rPr lang="en-US" smtClean="0"/>
+              <a:rPr lang="en-US"/>
               <a:t>Click to edit Master text styles</a:t>
             </a:r>
           </a:p>
           <a:p>
             <a:pPr lvl="1"/>
             <a:r>
-              <a:rPr lang="en-US" smtClean="0"/>
+              <a:rPr lang="en-US"/>
               <a:t>Second level</a:t>
             </a:r>
           </a:p>
           <a:p>
             <a:pPr lvl="2"/>
             <a:r>
-              <a:rPr lang="en-US" smtClean="0"/>
+              <a:rPr lang="en-US"/>
               <a:t>Third level</a:t>
             </a:r>
           </a:p>
           <a:p>
             <a:pPr lvl="3"/>
             <a:r>
-              <a:rPr lang="en-US" smtClean="0"/>
+              <a:rPr lang="en-US"/>
               <a:t>Fourth level</a:t>
             </a:r>
           </a:p>
           <a:p>
             <a:pPr lvl="4"/>
             <a:r>
-              <a:rPr lang="en-US" smtClean="0"/>
+              <a:rPr lang="en-US"/>
               <a:t>Fifth level</a:t>
             </a:r>
-            <a:endParaRPr lang="en-US"/>
           </a:p>
         </p:txBody>
       </p:sp>
@@ -773,7 +682,7 @@
             <a:fld id="{1D8BD707-D9CF-40AE-B4C6-C98DA3205C09}" type="datetimeFigureOut">
               <a:rPr lang="en-US" smtClean="0"/>
               <a:pPr/>
-              <a:t>8/1/2011</a:t>
+              <a:t>1/3/2024</a:t>
             </a:fld>
             <a:endParaRPr lang="en-US"/>
           </a:p>
@@ -863,10 +772,9 @@
           <a:lstStyle/>
           <a:p>
             <a:r>
-              <a:rPr lang="en-US" smtClean="0"/>
+              <a:rPr lang="en-US"/>
               <a:t>Click to edit Master title style</a:t>
             </a:r>
-            <a:endParaRPr lang="en-US"/>
           </a:p>
         </p:txBody>
       </p:sp>
@@ -887,38 +795,37 @@
           <a:p>
             <a:pPr lvl="0"/>
             <a:r>
-              <a:rPr lang="en-US" smtClean="0"/>
+              <a:rPr lang="en-US"/>
               <a:t>Click to edit Master text styles</a:t>
             </a:r>
           </a:p>
           <a:p>
             <a:pPr lvl="1"/>
             <a:r>
-              <a:rPr lang="en-US" smtClean="0"/>
+              <a:rPr lang="en-US"/>
               <a:t>Second level</a:t>
             </a:r>
           </a:p>
           <a:p>
             <a:pPr lvl="2"/>
             <a:r>
-              <a:rPr lang="en-US" smtClean="0"/>
+              <a:rPr lang="en-US"/>
               <a:t>Third level</a:t>
             </a:r>
           </a:p>
           <a:p>
             <a:pPr lvl="3"/>
             <a:r>
-              <a:rPr lang="en-US" smtClean="0"/>
+              <a:rPr lang="en-US"/>
               <a:t>Fourth level</a:t>
             </a:r>
           </a:p>
           <a:p>
             <a:pPr lvl="4"/>
             <a:r>
-              <a:rPr lang="en-US" smtClean="0"/>
+              <a:rPr lang="en-US"/>
               <a:t>Fifth level</a:t>
             </a:r>
-            <a:endParaRPr lang="en-US"/>
           </a:p>
         </p:txBody>
       </p:sp>
@@ -940,7 +847,7 @@
             <a:fld id="{1D8BD707-D9CF-40AE-B4C6-C98DA3205C09}" type="datetimeFigureOut">
               <a:rPr lang="en-US" smtClean="0"/>
               <a:pPr/>
-              <a:t>8/1/2011</a:t>
+              <a:t>1/3/2024</a:t>
             </a:fld>
             <a:endParaRPr lang="en-US"/>
           </a:p>
@@ -1039,10 +946,9 @@
           </a:lstStyle>
           <a:p>
             <a:r>
-              <a:rPr lang="en-US" smtClean="0"/>
+              <a:rPr lang="en-US"/>
               <a:t>Click to edit Master title style</a:t>
             </a:r>
-            <a:endParaRPr lang="en-US"/>
           </a:p>
         </p:txBody>
       </p:sp>
@@ -1159,7 +1065,7 @@
           <a:p>
             <a:pPr lvl="0"/>
             <a:r>
-              <a:rPr lang="en-US" smtClean="0"/>
+              <a:rPr lang="en-US"/>
               <a:t>Click to edit Master text styles</a:t>
             </a:r>
           </a:p>
@@ -1183,7 +1089,7 @@
             <a:fld id="{1D8BD707-D9CF-40AE-B4C6-C98DA3205C09}" type="datetimeFigureOut">
               <a:rPr lang="en-US" smtClean="0"/>
               <a:pPr/>
-              <a:t>8/1/2011</a:t>
+              <a:t>1/3/2024</a:t>
             </a:fld>
             <a:endParaRPr lang="en-US"/>
           </a:p>
@@ -1273,10 +1179,9 @@
           <a:lstStyle/>
           <a:p>
             <a:r>
-              <a:rPr lang="en-US" smtClean="0"/>
+              <a:rPr lang="en-US"/>
               <a:t>Click to edit Master title style</a:t>
             </a:r>
-            <a:endParaRPr lang="en-US"/>
           </a:p>
         </p:txBody>
       </p:sp>
@@ -1330,38 +1235,37 @@
           <a:p>
             <a:pPr lvl="0"/>
             <a:r>
-              <a:rPr lang="en-US" smtClean="0"/>
+              <a:rPr lang="en-US"/>
               <a:t>Click to edit Master text styles</a:t>
             </a:r>
           </a:p>
           <a:p>
             <a:pPr lvl="1"/>
             <a:r>
-              <a:rPr lang="en-US" smtClean="0"/>
+              <a:rPr lang="en-US"/>
               <a:t>Second level</a:t>
             </a:r>
           </a:p>
           <a:p>
             <a:pPr lvl="2"/>
             <a:r>
-              <a:rPr lang="en-US" smtClean="0"/>
+              <a:rPr lang="en-US"/>
               <a:t>Third level</a:t>
             </a:r>
           </a:p>
           <a:p>
             <a:pPr lvl="3"/>
             <a:r>
-              <a:rPr lang="en-US" smtClean="0"/>
+              <a:rPr lang="en-US"/>
               <a:t>Fourth level</a:t>
             </a:r>
           </a:p>
           <a:p>
             <a:pPr lvl="4"/>
             <a:r>
-              <a:rPr lang="en-US" smtClean="0"/>
+              <a:rPr lang="en-US"/>
               <a:t>Fifth level</a:t>
             </a:r>
-            <a:endParaRPr lang="en-US"/>
           </a:p>
         </p:txBody>
       </p:sp>
@@ -1415,38 +1319,37 @@
           <a:p>
             <a:pPr lvl="0"/>
             <a:r>
-              <a:rPr lang="en-US" smtClean="0"/>
+              <a:rPr lang="en-US"/>
               <a:t>Click to edit Master text styles</a:t>
             </a:r>
           </a:p>
           <a:p>
             <a:pPr lvl="1"/>
             <a:r>
-              <a:rPr lang="en-US" smtClean="0"/>
+              <a:rPr lang="en-US"/>
               <a:t>Second level</a:t>
             </a:r>
           </a:p>
           <a:p>
             <a:pPr lvl="2"/>
             <a:r>
-              <a:rPr lang="en-US" smtClean="0"/>
+              <a:rPr lang="en-US"/>
               <a:t>Third level</a:t>
             </a:r>
           </a:p>
           <a:p>
             <a:pPr lvl="3"/>
             <a:r>
-              <a:rPr lang="en-US" smtClean="0"/>
+              <a:rPr lang="en-US"/>
               <a:t>Fourth level</a:t>
             </a:r>
           </a:p>
           <a:p>
             <a:pPr lvl="4"/>
             <a:r>
-              <a:rPr lang="en-US" smtClean="0"/>
+              <a:rPr lang="en-US"/>
               <a:t>Fifth level</a:t>
             </a:r>
-            <a:endParaRPr lang="en-US"/>
           </a:p>
         </p:txBody>
       </p:sp>
@@ -1468,7 +1371,7 @@
             <a:fld id="{1D8BD707-D9CF-40AE-B4C6-C98DA3205C09}" type="datetimeFigureOut">
               <a:rPr lang="en-US" smtClean="0"/>
               <a:pPr/>
-              <a:t>8/1/2011</a:t>
+              <a:t>1/3/2024</a:t>
             </a:fld>
             <a:endParaRPr lang="en-US"/>
           </a:p>
@@ -1562,10 +1465,9 @@
           </a:lstStyle>
           <a:p>
             <a:r>
-              <a:rPr lang="en-US" smtClean="0"/>
+              <a:rPr lang="en-US"/>
               <a:t>Click to edit Master title style</a:t>
             </a:r>
-            <a:endParaRPr lang="en-US"/>
           </a:p>
         </p:txBody>
       </p:sp>
@@ -1628,7 +1530,7 @@
           <a:p>
             <a:pPr lvl="0"/>
             <a:r>
-              <a:rPr lang="en-US" smtClean="0"/>
+              <a:rPr lang="en-US"/>
               <a:t>Click to edit Master text styles</a:t>
             </a:r>
           </a:p>
@@ -1684,38 +1586,37 @@
           <a:p>
             <a:pPr lvl="0"/>
             <a:r>
-              <a:rPr lang="en-US" smtClean="0"/>
+              <a:rPr lang="en-US"/>
               <a:t>Click to edit Master text styles</a:t>
             </a:r>
           </a:p>
           <a:p>
             <a:pPr lvl="1"/>
             <a:r>
-              <a:rPr lang="en-US" smtClean="0"/>
+              <a:rPr lang="en-US"/>
               <a:t>Second level</a:t>
             </a:r>
           </a:p>
           <a:p>
             <a:pPr lvl="2"/>
             <a:r>
-              <a:rPr lang="en-US" smtClean="0"/>
+              <a:rPr lang="en-US"/>
               <a:t>Third level</a:t>
             </a:r>
           </a:p>
           <a:p>
             <a:pPr lvl="3"/>
             <a:r>
-              <a:rPr lang="en-US" smtClean="0"/>
+              <a:rPr lang="en-US"/>
               <a:t>Fourth level</a:t>
             </a:r>
           </a:p>
           <a:p>
             <a:pPr lvl="4"/>
             <a:r>
-              <a:rPr lang="en-US" smtClean="0"/>
+              <a:rPr lang="en-US"/>
               <a:t>Fifth level</a:t>
             </a:r>
-            <a:endParaRPr lang="en-US"/>
           </a:p>
         </p:txBody>
       </p:sp>
@@ -1778,7 +1679,7 @@
           <a:p>
             <a:pPr lvl="0"/>
             <a:r>
-              <a:rPr lang="en-US" smtClean="0"/>
+              <a:rPr lang="en-US"/>
               <a:t>Click to edit Master text styles</a:t>
             </a:r>
           </a:p>
@@ -1834,38 +1735,37 @@
           <a:p>
             <a:pPr lvl="0"/>
             <a:r>
-              <a:rPr lang="en-US" smtClean="0"/>
+              <a:rPr lang="en-US"/>
               <a:t>Click to edit Master text styles</a:t>
             </a:r>
           </a:p>
           <a:p>
             <a:pPr lvl="1"/>
             <a:r>
-              <a:rPr lang="en-US" smtClean="0"/>
+              <a:rPr lang="en-US"/>
               <a:t>Second level</a:t>
             </a:r>
           </a:p>
           <a:p>
             <a:pPr lvl="2"/>
             <a:r>
-              <a:rPr lang="en-US" smtClean="0"/>
+              <a:rPr lang="en-US"/>
               <a:t>Third level</a:t>
             </a:r>
           </a:p>
           <a:p>
             <a:pPr lvl="3"/>
             <a:r>
-              <a:rPr lang="en-US" smtClean="0"/>
+              <a:rPr lang="en-US"/>
               <a:t>Fourth level</a:t>
             </a:r>
           </a:p>
           <a:p>
             <a:pPr lvl="4"/>
             <a:r>
-              <a:rPr lang="en-US" smtClean="0"/>
+              <a:rPr lang="en-US"/>
               <a:t>Fifth level</a:t>
             </a:r>
-            <a:endParaRPr lang="en-US"/>
           </a:p>
         </p:txBody>
       </p:sp>
@@ -1887,7 +1787,7 @@
             <a:fld id="{1D8BD707-D9CF-40AE-B4C6-C98DA3205C09}" type="datetimeFigureOut">
               <a:rPr lang="en-US" smtClean="0"/>
               <a:pPr/>
-              <a:t>8/1/2011</a:t>
+              <a:t>1/3/2024</a:t>
             </a:fld>
             <a:endParaRPr lang="en-US"/>
           </a:p>
@@ -1977,10 +1877,9 @@
           <a:lstStyle/>
           <a:p>
             <a:r>
-              <a:rPr lang="en-US" smtClean="0"/>
+              <a:rPr lang="en-US"/>
               <a:t>Click to edit Master title style</a:t>
             </a:r>
-            <a:endParaRPr lang="en-US"/>
           </a:p>
         </p:txBody>
       </p:sp>
@@ -2002,7 +1901,7 @@
             <a:fld id="{1D8BD707-D9CF-40AE-B4C6-C98DA3205C09}" type="datetimeFigureOut">
               <a:rPr lang="en-US" smtClean="0"/>
               <a:pPr/>
-              <a:t>8/1/2011</a:t>
+              <a:t>1/3/2024</a:t>
             </a:fld>
             <a:endParaRPr lang="en-US"/>
           </a:p>
@@ -2094,7 +1993,7 @@
             <a:fld id="{1D8BD707-D9CF-40AE-B4C6-C98DA3205C09}" type="datetimeFigureOut">
               <a:rPr lang="en-US" smtClean="0"/>
               <a:pPr/>
-              <a:t>8/1/2011</a:t>
+              <a:t>1/3/2024</a:t>
             </a:fld>
             <a:endParaRPr lang="en-US"/>
           </a:p>
@@ -2193,10 +2092,9 @@
           </a:lstStyle>
           <a:p>
             <a:r>
-              <a:rPr lang="en-US" smtClean="0"/>
+              <a:rPr lang="en-US"/>
               <a:t>Click to edit Master title style</a:t>
             </a:r>
-            <a:endParaRPr lang="en-US"/>
           </a:p>
         </p:txBody>
       </p:sp>
@@ -2250,38 +2148,37 @@
           <a:p>
             <a:pPr lvl="0"/>
             <a:r>
-              <a:rPr lang="en-US" smtClean="0"/>
+              <a:rPr lang="en-US"/>
               <a:t>Click to edit Master text styles</a:t>
             </a:r>
           </a:p>
           <a:p>
             <a:pPr lvl="1"/>
             <a:r>
-              <a:rPr lang="en-US" smtClean="0"/>
+              <a:rPr lang="en-US"/>
               <a:t>Second level</a:t>
             </a:r>
           </a:p>
           <a:p>
             <a:pPr lvl="2"/>
             <a:r>
-              <a:rPr lang="en-US" smtClean="0"/>
+              <a:rPr lang="en-US"/>
               <a:t>Third level</a:t>
             </a:r>
           </a:p>
           <a:p>
             <a:pPr lvl="3"/>
             <a:r>
-              <a:rPr lang="en-US" smtClean="0"/>
+              <a:rPr lang="en-US"/>
               <a:t>Fourth level</a:t>
             </a:r>
           </a:p>
           <a:p>
             <a:pPr lvl="4"/>
             <a:r>
-              <a:rPr lang="en-US" smtClean="0"/>
+              <a:rPr lang="en-US"/>
               <a:t>Fifth level</a:t>
             </a:r>
-            <a:endParaRPr lang="en-US"/>
           </a:p>
         </p:txBody>
       </p:sp>
@@ -2344,7 +2241,7 @@
           <a:p>
             <a:pPr lvl="0"/>
             <a:r>
-              <a:rPr lang="en-US" smtClean="0"/>
+              <a:rPr lang="en-US"/>
               <a:t>Click to edit Master text styles</a:t>
             </a:r>
           </a:p>
@@ -2368,7 +2265,7 @@
             <a:fld id="{1D8BD707-D9CF-40AE-B4C6-C98DA3205C09}" type="datetimeFigureOut">
               <a:rPr lang="en-US" smtClean="0"/>
               <a:pPr/>
-              <a:t>8/1/2011</a:t>
+              <a:t>1/3/2024</a:t>
             </a:fld>
             <a:endParaRPr lang="en-US"/>
           </a:p>
@@ -2467,10 +2364,9 @@
           </a:lstStyle>
           <a:p>
             <a:r>
-              <a:rPr lang="en-US" smtClean="0"/>
+              <a:rPr lang="en-US"/>
               <a:t>Click to edit Master title style</a:t>
             </a:r>
-            <a:endParaRPr lang="en-US"/>
           </a:p>
         </p:txBody>
       </p:sp>
@@ -2594,7 +2490,7 @@
           <a:p>
             <a:pPr lvl="0"/>
             <a:r>
-              <a:rPr lang="en-US" smtClean="0"/>
+              <a:rPr lang="en-US"/>
               <a:t>Click to edit Master text styles</a:t>
             </a:r>
           </a:p>
@@ -2618,7 +2514,7 @@
             <a:fld id="{1D8BD707-D9CF-40AE-B4C6-C98DA3205C09}" type="datetimeFigureOut">
               <a:rPr lang="en-US" smtClean="0"/>
               <a:pPr/>
-              <a:t>8/1/2011</a:t>
+              <a:t>1/3/2024</a:t>
             </a:fld>
             <a:endParaRPr lang="en-US"/>
           </a:p>
@@ -2723,10 +2619,9 @@
           <a:lstStyle/>
           <a:p>
             <a:r>
-              <a:rPr lang="en-US" smtClean="0"/>
+              <a:rPr lang="en-US"/>
               <a:t>Click to edit Master title style</a:t>
             </a:r>
-            <a:endParaRPr lang="en-US"/>
           </a:p>
         </p:txBody>
       </p:sp>
@@ -2757,38 +2652,37 @@
           <a:p>
             <a:pPr lvl="0"/>
             <a:r>
-              <a:rPr lang="en-US" smtClean="0"/>
+              <a:rPr lang="en-US"/>
               <a:t>Click to edit Master text styles</a:t>
             </a:r>
           </a:p>
           <a:p>
             <a:pPr lvl="1"/>
             <a:r>
-              <a:rPr lang="en-US" smtClean="0"/>
+              <a:rPr lang="en-US"/>
               <a:t>Second level</a:t>
             </a:r>
           </a:p>
           <a:p>
             <a:pPr lvl="2"/>
             <a:r>
-              <a:rPr lang="en-US" smtClean="0"/>
+              <a:rPr lang="en-US"/>
               <a:t>Third level</a:t>
             </a:r>
           </a:p>
           <a:p>
             <a:pPr lvl="3"/>
             <a:r>
-              <a:rPr lang="en-US" smtClean="0"/>
+              <a:rPr lang="en-US"/>
               <a:t>Fourth level</a:t>
             </a:r>
           </a:p>
           <a:p>
             <a:pPr lvl="4"/>
             <a:r>
-              <a:rPr lang="en-US" smtClean="0"/>
+              <a:rPr lang="en-US"/>
               <a:t>Fifth level</a:t>
             </a:r>
-            <a:endParaRPr lang="en-US"/>
           </a:p>
         </p:txBody>
       </p:sp>
@@ -2828,7 +2722,7 @@
             <a:fld id="{1D8BD707-D9CF-40AE-B4C6-C98DA3205C09}" type="datetimeFigureOut">
               <a:rPr lang="en-US" smtClean="0"/>
               <a:pPr/>
-              <a:t>8/1/2011</a:t>
+              <a:t>1/3/2024</a:t>
             </a:fld>
             <a:endParaRPr lang="en-US"/>
           </a:p>
@@ -3183,7 +3077,7 @@
 </file>
 
 <file path=ppt/slides/slide1.xml><?xml version="1.0" encoding="utf-8"?>
-<p:sld xmlns:p="http://schemas.openxmlformats.org/presentationml/2006/main" xmlns:a="http://schemas.openxmlformats.org/drawingml/2006/main">
+<p:sld xmlns:a="http://schemas.openxmlformats.org/drawingml/2006/main" xmlns:r="http://schemas.openxmlformats.org/officeDocument/2006/relationships" xmlns:p="http://schemas.openxmlformats.org/presentationml/2006/main">
   <p:cSld>
     <p:spTree>
       <p:nvGrpSpPr>
@@ -3201,12 +3095,12 @@
       </p:grpSpPr>
       <p:grpSp>
         <p:nvGrpSpPr>
-          <p:cNvPr name="Group 2" id="2"/>
+          <p:cNvPr id="2" name="Group 2"/>
           <p:cNvGrpSpPr/>
           <p:nvPr/>
         </p:nvGrpSpPr>
         <p:grpSpPr>
-          <a:xfrm rot="0">
+          <a:xfrm>
             <a:off x="1240790" y="0"/>
             <a:ext cx="212090" cy="5143500"/>
             <a:chOff x="0" y="0"/>
@@ -3215,12 +3109,12 @@
         </p:grpSpPr>
         <p:sp>
           <p:nvSpPr>
-            <p:cNvPr name="Freeform 3" id="3"/>
+            <p:cNvPr id="3" name="Freeform 3"/>
             <p:cNvSpPr/>
             <p:nvPr/>
           </p:nvSpPr>
           <p:spPr>
-            <a:xfrm flipH="false" flipV="false" rot="0">
+            <a:xfrm>
               <a:off x="0" y="0"/>
               <a:ext cx="55859" cy="1354667"/>
             </a:xfrm>
@@ -3229,9 +3123,9 @@
               <a:gdLst/>
               <a:ahLst/>
               <a:cxnLst/>
-              <a:rect r="r" b="b" t="t" l="l"/>
+              <a:rect l="l" t="t" r="r" b="b"/>
               <a:pathLst>
-                <a:path h="1354667" w="55859">
+                <a:path w="55859" h="1354667">
                   <a:moveTo>
                     <a:pt x="0" y="0"/>
                   </a:moveTo>
@@ -3255,8 +3149,8 @@
         </p:sp>
         <p:sp>
           <p:nvSpPr>
-            <p:cNvPr name="TextBox 4" id="4"/>
-            <p:cNvSpPr txBox="true"/>
+            <p:cNvPr id="4" name="TextBox 4"/>
+            <p:cNvSpPr txBox="1"/>
             <p:nvPr/>
           </p:nvSpPr>
           <p:spPr>
@@ -3269,7 +3163,7 @@
             </a:prstGeom>
           </p:spPr>
           <p:txBody>
-            <a:bodyPr anchor="ctr" rtlCol="false" tIns="50800" lIns="50800" bIns="50800" rIns="50800"/>
+            <a:bodyPr lIns="50800" tIns="50800" rIns="50800" bIns="50800" rtlCol="0" anchor="ctr"/>
             <a:lstStyle/>
             <a:p>
               <a:pPr algn="ctr">
@@ -3280,18 +3174,19 @@
                   <a:spcPct val="0"/>
                 </a:spcBef>
               </a:pPr>
+              <a:endParaRPr/>
             </a:p>
           </p:txBody>
         </p:sp>
       </p:grpSp>
       <p:sp>
         <p:nvSpPr>
-          <p:cNvPr name="TextBox 5" id="5"/>
-          <p:cNvSpPr txBox="true"/>
+          <p:cNvPr id="5" name="TextBox 5"/>
+          <p:cNvSpPr txBox="1"/>
           <p:nvPr/>
         </p:nvSpPr>
         <p:spPr>
-          <a:xfrm rot="0">
+          <a:xfrm>
             <a:off x="2829775" y="4088040"/>
             <a:ext cx="9288593" cy="1360170"/>
           </a:xfrm>
@@ -3300,7 +3195,7 @@
           </a:prstGeom>
         </p:spPr>
         <p:txBody>
-          <a:bodyPr anchor="t" rtlCol="false" tIns="0" lIns="0" bIns="0" rIns="0">
+          <a:bodyPr lIns="0" tIns="0" rIns="0" bIns="0" rtlCol="0" anchor="t">
             <a:spAutoFit/>
           </a:bodyPr>
           <a:lstStyle/>
@@ -3324,12 +3219,12 @@
       </p:sp>
       <p:sp>
         <p:nvSpPr>
-          <p:cNvPr name="TextBox 6" id="6"/>
-          <p:cNvSpPr txBox="true"/>
+          <p:cNvPr id="6" name="TextBox 6"/>
+          <p:cNvSpPr txBox="1"/>
           <p:nvPr/>
         </p:nvSpPr>
         <p:spPr>
-          <a:xfrm rot="0">
+          <a:xfrm>
             <a:off x="2829775" y="5238750"/>
             <a:ext cx="9288593" cy="1360170"/>
           </a:xfrm>
@@ -3338,7 +3233,7 @@
           </a:prstGeom>
         </p:spPr>
         <p:txBody>
-          <a:bodyPr anchor="t" rtlCol="false" tIns="0" lIns="0" bIns="0" rIns="0">
+          <a:bodyPr lIns="0" tIns="0" rIns="0" bIns="0" rtlCol="0" anchor="t">
             <a:spAutoFit/>
           </a:bodyPr>
           <a:lstStyle/>
@@ -3362,8 +3257,8 @@
       </p:sp>
       <p:sp>
         <p:nvSpPr>
-          <p:cNvPr name="TextBox 7" id="7"/>
-          <p:cNvSpPr txBox="true"/>
+          <p:cNvPr id="7" name="TextBox 7"/>
+          <p:cNvSpPr txBox="1"/>
           <p:nvPr/>
         </p:nvSpPr>
         <p:spPr>
@@ -3376,7 +3271,7 @@
           </a:prstGeom>
         </p:spPr>
         <p:txBody>
-          <a:bodyPr anchor="t" rtlCol="false" tIns="0" lIns="0" bIns="0" rIns="0">
+          <a:bodyPr lIns="0" tIns="0" rIns="0" bIns="0" rtlCol="0" anchor="t">
             <a:spAutoFit/>
           </a:bodyPr>
           <a:lstStyle/>
@@ -3400,21 +3295,21 @@
       </p:sp>
       <p:sp>
         <p:nvSpPr>
-          <p:cNvPr name="TextBox 8" id="8"/>
-          <p:cNvSpPr txBox="true"/>
+          <p:cNvPr id="8" name="TextBox 8"/>
+          <p:cNvSpPr txBox="1"/>
           <p:nvPr/>
         </p:nvSpPr>
         <p:spPr>
-          <a:xfrm rot="0">
+          <a:xfrm>
             <a:off x="2829775" y="7008131"/>
-            <a:ext cx="9288593" cy="481330"/>
+            <a:ext cx="9288593" cy="444737"/>
           </a:xfrm>
           <a:prstGeom prst="rect">
             <a:avLst/>
           </a:prstGeom>
         </p:spPr>
         <p:txBody>
-          <a:bodyPr anchor="t" rtlCol="false" tIns="0" lIns="0" bIns="0" rIns="0">
+          <a:bodyPr lIns="0" tIns="0" rIns="0" bIns="0" rtlCol="0" anchor="t">
             <a:spAutoFit/>
           </a:bodyPr>
           <a:lstStyle/>
@@ -3425,25 +3320,25 @@
               </a:lnSpc>
             </a:pPr>
             <a:r>
-              <a:rPr lang="en-US" sz="2800" spc="963">
+              <a:rPr lang="en-US" sz="2800" spc="963" dirty="0">
                 <a:solidFill>
                   <a:srgbClr val="101010"/>
                 </a:solidFill>
                 <a:latin typeface="Montserrat Classic"/>
               </a:rPr>
-              <a:t>KELOMPOK 8</a:t>
-            </a:r>
-          </a:p>
-        </p:txBody>
-      </p:sp>
-      <p:sp>
-        <p:nvSpPr>
-          <p:cNvPr name="TextBox 9" id="9"/>
-          <p:cNvSpPr txBox="true"/>
+              <a:t>KELOMPOK 7</a:t>
+            </a:r>
+          </a:p>
+        </p:txBody>
+      </p:sp>
+      <p:sp>
+        <p:nvSpPr>
+          <p:cNvPr id="9" name="TextBox 9"/>
+          <p:cNvSpPr txBox="1"/>
           <p:nvPr/>
         </p:nvSpPr>
         <p:spPr>
-          <a:xfrm rot="0">
+          <a:xfrm>
             <a:off x="14997446" y="8636800"/>
             <a:ext cx="2261854" cy="481330"/>
           </a:xfrm>
@@ -3452,7 +3347,7 @@
           </a:prstGeom>
         </p:spPr>
         <p:txBody>
-          <a:bodyPr anchor="t" rtlCol="false" tIns="0" lIns="0" bIns="0" rIns="0">
+          <a:bodyPr lIns="0" tIns="0" rIns="0" bIns="0" rtlCol="0" anchor="t">
             <a:spAutoFit/>
           </a:bodyPr>
           <a:lstStyle/>
@@ -3476,12 +3371,12 @@
       </p:sp>
       <p:grpSp>
         <p:nvGrpSpPr>
-          <p:cNvPr name="Group 10" id="10"/>
+          <p:cNvPr id="10" name="Group 10"/>
           <p:cNvGrpSpPr/>
           <p:nvPr/>
         </p:nvGrpSpPr>
         <p:grpSpPr>
-          <a:xfrm rot="0">
+          <a:xfrm>
             <a:off x="14500955" y="1866623"/>
             <a:ext cx="2758345" cy="245871"/>
             <a:chOff x="0" y="0"/>
@@ -3490,12 +3385,12 @@
         </p:grpSpPr>
         <p:sp>
           <p:nvSpPr>
-            <p:cNvPr name="Freeform 11" id="11"/>
+            <p:cNvPr id="11" name="Freeform 11"/>
             <p:cNvSpPr/>
             <p:nvPr/>
           </p:nvSpPr>
           <p:spPr>
-            <a:xfrm flipH="false" flipV="false" rot="0">
+            <a:xfrm>
               <a:off x="0" y="0"/>
               <a:ext cx="726478" cy="64756"/>
             </a:xfrm>
@@ -3504,9 +3399,9 @@
               <a:gdLst/>
               <a:ahLst/>
               <a:cxnLst/>
-              <a:rect r="r" b="b" t="t" l="l"/>
+              <a:rect l="l" t="t" r="r" b="b"/>
               <a:pathLst>
-                <a:path h="64756" w="726478">
+                <a:path w="726478" h="64756">
                   <a:moveTo>
                     <a:pt x="0" y="0"/>
                   </a:moveTo>
@@ -3530,8 +3425,8 @@
         </p:sp>
         <p:sp>
           <p:nvSpPr>
-            <p:cNvPr name="TextBox 12" id="12"/>
-            <p:cNvSpPr txBox="true"/>
+            <p:cNvPr id="12" name="TextBox 12"/>
+            <p:cNvSpPr txBox="1"/>
             <p:nvPr/>
           </p:nvSpPr>
           <p:spPr>
@@ -3544,7 +3439,7 @@
             </a:prstGeom>
           </p:spPr>
           <p:txBody>
-            <a:bodyPr anchor="ctr" rtlCol="false" tIns="50800" lIns="50800" bIns="50800" rIns="50800"/>
+            <a:bodyPr lIns="50800" tIns="50800" rIns="50800" bIns="50800" rtlCol="0" anchor="ctr"/>
             <a:lstStyle/>
             <a:p>
               <a:pPr algn="ctr">
@@ -3555,18 +3450,19 @@
                   <a:spcPct val="0"/>
                 </a:spcBef>
               </a:pPr>
+              <a:endParaRPr/>
             </a:p>
           </p:txBody>
         </p:sp>
       </p:grpSp>
       <p:sp>
         <p:nvSpPr>
-          <p:cNvPr name="TextBox 13" id="13"/>
-          <p:cNvSpPr txBox="true"/>
+          <p:cNvPr id="13" name="TextBox 13"/>
+          <p:cNvSpPr txBox="1"/>
           <p:nvPr/>
         </p:nvSpPr>
         <p:spPr>
-          <a:xfrm rot="0">
+          <a:xfrm>
             <a:off x="13252461" y="952500"/>
             <a:ext cx="3489971" cy="622935"/>
           </a:xfrm>
@@ -3575,7 +3471,7 @@
           </a:prstGeom>
         </p:spPr>
         <p:txBody>
-          <a:bodyPr anchor="t" rtlCol="false" tIns="0" lIns="0" bIns="0" rIns="0">
+          <a:bodyPr lIns="0" tIns="0" rIns="0" bIns="0" rtlCol="0" anchor="t">
             <a:spAutoFit/>
           </a:bodyPr>
           <a:lstStyle/>
@@ -3606,7 +3502,7 @@
 </file>
 
 <file path=ppt/slides/slide10.xml><?xml version="1.0" encoding="utf-8"?>
-<p:sld xmlns:p="http://schemas.openxmlformats.org/presentationml/2006/main" xmlns:a="http://schemas.openxmlformats.org/drawingml/2006/main" xmlns:r="http://schemas.openxmlformats.org/officeDocument/2006/relationships">
+<p:sld xmlns:a="http://schemas.openxmlformats.org/drawingml/2006/main" xmlns:r="http://schemas.openxmlformats.org/officeDocument/2006/relationships" xmlns:p="http://schemas.openxmlformats.org/presentationml/2006/main">
   <p:cSld>
     <p:spTree>
       <p:nvGrpSpPr>
@@ -3624,12 +3520,12 @@
       </p:grpSpPr>
       <p:sp>
         <p:nvSpPr>
-          <p:cNvPr name="Freeform 2" id="2"/>
+          <p:cNvPr id="2" name="Freeform 2"/>
           <p:cNvSpPr/>
           <p:nvPr/>
         </p:nvSpPr>
         <p:spPr>
-          <a:xfrm flipH="false" flipV="false" rot="0">
+          <a:xfrm>
             <a:off x="7221902" y="1836942"/>
             <a:ext cx="4857565" cy="5746003"/>
           </a:xfrm>
@@ -3638,9 +3534,9 @@
             <a:gdLst/>
             <a:ahLst/>
             <a:cxnLst/>
-            <a:rect r="r" b="b" t="t" l="l"/>
+            <a:rect l="l" t="t" r="r" b="b"/>
             <a:pathLst>
-              <a:path h="5746003" w="4857565">
+              <a:path w="4857565" h="5746003">
                 <a:moveTo>
                   <a:pt x="0" y="0"/>
                 </a:moveTo>
@@ -3663,19 +3559,19 @@
           <a:blipFill>
             <a:blip r:embed="rId2"/>
             <a:stretch>
-              <a:fillRect l="0" t="0" r="0" b="0"/>
+              <a:fillRect/>
             </a:stretch>
           </a:blipFill>
         </p:spPr>
       </p:sp>
       <p:sp>
         <p:nvSpPr>
-          <p:cNvPr name="Freeform 3" id="3"/>
+          <p:cNvPr id="3" name="Freeform 3"/>
           <p:cNvSpPr/>
           <p:nvPr/>
         </p:nvSpPr>
         <p:spPr>
-          <a:xfrm flipH="false" flipV="false" rot="0">
+          <a:xfrm>
             <a:off x="367115" y="2270498"/>
             <a:ext cx="6348103" cy="4878891"/>
           </a:xfrm>
@@ -3684,9 +3580,9 @@
             <a:gdLst/>
             <a:ahLst/>
             <a:cxnLst/>
-            <a:rect r="r" b="b" t="t" l="l"/>
+            <a:rect l="l" t="t" r="r" b="b"/>
             <a:pathLst>
-              <a:path h="4878891" w="6348103">
+              <a:path w="6348103" h="4878891">
                 <a:moveTo>
                   <a:pt x="0" y="0"/>
                 </a:moveTo>
@@ -3709,19 +3605,19 @@
           <a:blipFill>
             <a:blip r:embed="rId3"/>
             <a:stretch>
-              <a:fillRect l="0" t="0" r="0" b="0"/>
+              <a:fillRect/>
             </a:stretch>
           </a:blipFill>
         </p:spPr>
       </p:sp>
       <p:sp>
         <p:nvSpPr>
-          <p:cNvPr name="Freeform 4" id="4"/>
+          <p:cNvPr id="4" name="Freeform 4"/>
           <p:cNvSpPr/>
           <p:nvPr/>
         </p:nvSpPr>
         <p:spPr>
-          <a:xfrm flipH="false" flipV="false" rot="0">
+          <a:xfrm>
             <a:off x="12586150" y="2165674"/>
             <a:ext cx="4673150" cy="5088541"/>
           </a:xfrm>
@@ -3730,9 +3626,9 @@
             <a:gdLst/>
             <a:ahLst/>
             <a:cxnLst/>
-            <a:rect r="r" b="b" t="t" l="l"/>
+            <a:rect l="l" t="t" r="r" b="b"/>
             <a:pathLst>
-              <a:path h="5088541" w="4673150">
+              <a:path w="4673150" h="5088541">
                 <a:moveTo>
                   <a:pt x="0" y="0"/>
                 </a:moveTo>
@@ -3755,19 +3651,19 @@
           <a:blipFill>
             <a:blip r:embed="rId4"/>
             <a:stretch>
-              <a:fillRect l="0" t="0" r="0" b="0"/>
+              <a:fillRect/>
             </a:stretch>
           </a:blipFill>
         </p:spPr>
       </p:sp>
       <p:sp>
         <p:nvSpPr>
-          <p:cNvPr name="TextBox 5" id="5"/>
-          <p:cNvSpPr txBox="true"/>
+          <p:cNvPr id="5" name="TextBox 5"/>
+          <p:cNvSpPr txBox="1"/>
           <p:nvPr/>
         </p:nvSpPr>
         <p:spPr>
-          <a:xfrm rot="0">
+          <a:xfrm>
             <a:off x="702300" y="8367440"/>
             <a:ext cx="16557000" cy="1180465"/>
           </a:xfrm>
@@ -3776,7 +3672,7 @@
           </a:prstGeom>
         </p:spPr>
         <p:txBody>
-          <a:bodyPr anchor="t" rtlCol="false" tIns="0" lIns="0" bIns="0" rIns="0">
+          <a:bodyPr lIns="0" tIns="0" rIns="0" bIns="0" rtlCol="0" anchor="t">
             <a:spAutoFit/>
           </a:bodyPr>
           <a:lstStyle/>
@@ -3807,7 +3703,7 @@
 </file>
 
 <file path=ppt/slides/slide11.xml><?xml version="1.0" encoding="utf-8"?>
-<p:sld xmlns:p="http://schemas.openxmlformats.org/presentationml/2006/main" xmlns:a="http://schemas.openxmlformats.org/drawingml/2006/main">
+<p:sld xmlns:a="http://schemas.openxmlformats.org/drawingml/2006/main" xmlns:r="http://schemas.openxmlformats.org/officeDocument/2006/relationships" xmlns:p="http://schemas.openxmlformats.org/presentationml/2006/main">
   <p:cSld>
     <p:spTree>
       <p:nvGrpSpPr>
@@ -3825,12 +3721,12 @@
       </p:grpSpPr>
       <p:grpSp>
         <p:nvGrpSpPr>
-          <p:cNvPr name="Group 2" id="2"/>
+          <p:cNvPr id="2" name="Group 2"/>
           <p:cNvGrpSpPr/>
           <p:nvPr/>
         </p:nvGrpSpPr>
         <p:grpSpPr>
-          <a:xfrm rot="0">
+          <a:xfrm>
             <a:off x="1240790" y="0"/>
             <a:ext cx="212090" cy="5143500"/>
             <a:chOff x="0" y="0"/>
@@ -3839,12 +3735,12 @@
         </p:grpSpPr>
         <p:sp>
           <p:nvSpPr>
-            <p:cNvPr name="Freeform 3" id="3"/>
+            <p:cNvPr id="3" name="Freeform 3"/>
             <p:cNvSpPr/>
             <p:nvPr/>
           </p:nvSpPr>
           <p:spPr>
-            <a:xfrm flipH="false" flipV="false" rot="0">
+            <a:xfrm>
               <a:off x="0" y="0"/>
               <a:ext cx="55859" cy="1354667"/>
             </a:xfrm>
@@ -3853,9 +3749,9 @@
               <a:gdLst/>
               <a:ahLst/>
               <a:cxnLst/>
-              <a:rect r="r" b="b" t="t" l="l"/>
+              <a:rect l="l" t="t" r="r" b="b"/>
               <a:pathLst>
-                <a:path h="1354667" w="55859">
+                <a:path w="55859" h="1354667">
                   <a:moveTo>
                     <a:pt x="0" y="0"/>
                   </a:moveTo>
@@ -3879,8 +3775,8 @@
         </p:sp>
         <p:sp>
           <p:nvSpPr>
-            <p:cNvPr name="TextBox 4" id="4"/>
-            <p:cNvSpPr txBox="true"/>
+            <p:cNvPr id="4" name="TextBox 4"/>
+            <p:cNvSpPr txBox="1"/>
             <p:nvPr/>
           </p:nvSpPr>
           <p:spPr>
@@ -3893,7 +3789,7 @@
             </a:prstGeom>
           </p:spPr>
           <p:txBody>
-            <a:bodyPr anchor="ctr" rtlCol="false" tIns="50800" lIns="50800" bIns="50800" rIns="50800"/>
+            <a:bodyPr lIns="50800" tIns="50800" rIns="50800" bIns="50800" rtlCol="0" anchor="ctr"/>
             <a:lstStyle/>
             <a:p>
               <a:pPr algn="ctr">
@@ -3904,18 +3800,19 @@
                   <a:spcPct val="0"/>
                 </a:spcBef>
               </a:pPr>
+              <a:endParaRPr/>
             </a:p>
           </p:txBody>
         </p:sp>
       </p:grpSp>
       <p:grpSp>
         <p:nvGrpSpPr>
-          <p:cNvPr name="Group 5" id="5"/>
+          <p:cNvPr id="5" name="Group 5"/>
           <p:cNvGrpSpPr/>
           <p:nvPr/>
         </p:nvGrpSpPr>
         <p:grpSpPr>
-          <a:xfrm rot="0">
+          <a:xfrm>
             <a:off x="14500955" y="1866623"/>
             <a:ext cx="2758345" cy="245871"/>
             <a:chOff x="0" y="0"/>
@@ -3924,12 +3821,12 @@
         </p:grpSpPr>
         <p:sp>
           <p:nvSpPr>
-            <p:cNvPr name="Freeform 6" id="6"/>
+            <p:cNvPr id="6" name="Freeform 6"/>
             <p:cNvSpPr/>
             <p:nvPr/>
           </p:nvSpPr>
           <p:spPr>
-            <a:xfrm flipH="false" flipV="false" rot="0">
+            <a:xfrm>
               <a:off x="0" y="0"/>
               <a:ext cx="726478" cy="64756"/>
             </a:xfrm>
@@ -3938,9 +3835,9 @@
               <a:gdLst/>
               <a:ahLst/>
               <a:cxnLst/>
-              <a:rect r="r" b="b" t="t" l="l"/>
+              <a:rect l="l" t="t" r="r" b="b"/>
               <a:pathLst>
-                <a:path h="64756" w="726478">
+                <a:path w="726478" h="64756">
                   <a:moveTo>
                     <a:pt x="0" y="0"/>
                   </a:moveTo>
@@ -3964,8 +3861,8 @@
         </p:sp>
         <p:sp>
           <p:nvSpPr>
-            <p:cNvPr name="TextBox 7" id="7"/>
-            <p:cNvSpPr txBox="true"/>
+            <p:cNvPr id="7" name="TextBox 7"/>
+            <p:cNvSpPr txBox="1"/>
             <p:nvPr/>
           </p:nvSpPr>
           <p:spPr>
@@ -3978,7 +3875,7 @@
             </a:prstGeom>
           </p:spPr>
           <p:txBody>
-            <a:bodyPr anchor="ctr" rtlCol="false" tIns="50800" lIns="50800" bIns="50800" rIns="50800"/>
+            <a:bodyPr lIns="50800" tIns="50800" rIns="50800" bIns="50800" rtlCol="0" anchor="ctr"/>
             <a:lstStyle/>
             <a:p>
               <a:pPr algn="ctr">
@@ -3989,18 +3886,19 @@
                   <a:spcPct val="0"/>
                 </a:spcBef>
               </a:pPr>
+              <a:endParaRPr/>
             </a:p>
           </p:txBody>
         </p:sp>
       </p:grpSp>
       <p:sp>
         <p:nvSpPr>
-          <p:cNvPr name="TextBox 8" id="8"/>
-          <p:cNvSpPr txBox="true"/>
+          <p:cNvPr id="8" name="TextBox 8"/>
+          <p:cNvSpPr txBox="1"/>
           <p:nvPr/>
         </p:nvSpPr>
         <p:spPr>
-          <a:xfrm rot="0">
+          <a:xfrm>
             <a:off x="2794627" y="4105507"/>
             <a:ext cx="9288593" cy="1360170"/>
           </a:xfrm>
@@ -4009,7 +3907,7 @@
           </a:prstGeom>
         </p:spPr>
         <p:txBody>
-          <a:bodyPr anchor="t" rtlCol="false" tIns="0" lIns="0" bIns="0" rIns="0">
+          <a:bodyPr lIns="0" tIns="0" rIns="0" bIns="0" rtlCol="0" anchor="t">
             <a:spAutoFit/>
           </a:bodyPr>
           <a:lstStyle/>
@@ -4033,21 +3931,21 @@
       </p:sp>
       <p:sp>
         <p:nvSpPr>
-          <p:cNvPr name="TextBox 9" id="9"/>
-          <p:cNvSpPr txBox="true"/>
+          <p:cNvPr id="9" name="TextBox 9"/>
+          <p:cNvSpPr txBox="1"/>
           <p:nvPr/>
         </p:nvSpPr>
         <p:spPr>
           <a:xfrm rot="-5400000">
-            <a:off x="-775100" y="6890150"/>
-            <a:ext cx="3974630" cy="481330"/>
+            <a:off x="-775100" y="6908446"/>
+            <a:ext cx="3974630" cy="444737"/>
           </a:xfrm>
           <a:prstGeom prst="rect">
             <a:avLst/>
           </a:prstGeom>
         </p:spPr>
         <p:txBody>
-          <a:bodyPr anchor="t" rtlCol="false" tIns="0" lIns="0" bIns="0" rIns="0">
+          <a:bodyPr lIns="0" tIns="0" rIns="0" bIns="0" rtlCol="0" anchor="t">
             <a:spAutoFit/>
           </a:bodyPr>
           <a:lstStyle/>
@@ -4058,25 +3956,34 @@
               </a:lnSpc>
             </a:pPr>
             <a:r>
-              <a:rPr lang="en-US" sz="2800">
+              <a:rPr lang="en-US" sz="2800" dirty="0" err="1">
                 <a:solidFill>
                   <a:srgbClr val="101010"/>
                 </a:solidFill>
                 <a:latin typeface="Montserrat Classic"/>
               </a:rPr>
-              <a:t>Kelompok 8</a:t>
-            </a:r>
-          </a:p>
-        </p:txBody>
-      </p:sp>
-      <p:sp>
-        <p:nvSpPr>
-          <p:cNvPr name="TextBox 10" id="10"/>
-          <p:cNvSpPr txBox="true"/>
+              <a:t>Kelompok</a:t>
+            </a:r>
+            <a:r>
+              <a:rPr lang="en-US" sz="2800" dirty="0">
+                <a:solidFill>
+                  <a:srgbClr val="101010"/>
+                </a:solidFill>
+                <a:latin typeface="Montserrat Classic"/>
+              </a:rPr>
+              <a:t> 7</a:t>
+            </a:r>
+          </a:p>
+        </p:txBody>
+      </p:sp>
+      <p:sp>
+        <p:nvSpPr>
+          <p:cNvPr id="10" name="TextBox 10"/>
+          <p:cNvSpPr txBox="1"/>
           <p:nvPr/>
         </p:nvSpPr>
         <p:spPr>
-          <a:xfrm rot="0">
+          <a:xfrm>
             <a:off x="14997446" y="8636800"/>
             <a:ext cx="2261854" cy="481330"/>
           </a:xfrm>
@@ -4085,7 +3992,7 @@
           </a:prstGeom>
         </p:spPr>
         <p:txBody>
-          <a:bodyPr anchor="t" rtlCol="false" tIns="0" lIns="0" bIns="0" rIns="0">
+          <a:bodyPr lIns="0" tIns="0" rIns="0" bIns="0" rtlCol="0" anchor="t">
             <a:spAutoFit/>
           </a:bodyPr>
           <a:lstStyle/>
@@ -4109,12 +4016,12 @@
       </p:sp>
       <p:sp>
         <p:nvSpPr>
-          <p:cNvPr name="TextBox 11" id="11"/>
-          <p:cNvSpPr txBox="true"/>
+          <p:cNvPr id="11" name="TextBox 11"/>
+          <p:cNvSpPr txBox="1"/>
           <p:nvPr/>
         </p:nvSpPr>
         <p:spPr>
-          <a:xfrm rot="0">
+          <a:xfrm>
             <a:off x="13769329" y="952500"/>
             <a:ext cx="3489971" cy="622935"/>
           </a:xfrm>
@@ -4123,7 +4030,7 @@
           </a:prstGeom>
         </p:spPr>
         <p:txBody>
-          <a:bodyPr anchor="t" rtlCol="false" tIns="0" lIns="0" bIns="0" rIns="0">
+          <a:bodyPr lIns="0" tIns="0" rIns="0" bIns="0" rtlCol="0" anchor="t">
             <a:spAutoFit/>
           </a:bodyPr>
           <a:lstStyle/>
@@ -4154,7 +4061,7 @@
 </file>
 
 <file path=ppt/slides/slide2.xml><?xml version="1.0" encoding="utf-8"?>
-<p:sld xmlns:p="http://schemas.openxmlformats.org/presentationml/2006/main" xmlns:a="http://schemas.openxmlformats.org/drawingml/2006/main" xmlns:r="http://schemas.openxmlformats.org/officeDocument/2006/relationships">
+<p:sld xmlns:a="http://schemas.openxmlformats.org/drawingml/2006/main" xmlns:r="http://schemas.openxmlformats.org/officeDocument/2006/relationships" xmlns:p="http://schemas.openxmlformats.org/presentationml/2006/main">
   <p:cSld>
     <p:spTree>
       <p:nvGrpSpPr>
@@ -4172,12 +4079,12 @@
       </p:grpSpPr>
       <p:grpSp>
         <p:nvGrpSpPr>
-          <p:cNvPr name="Group 2" id="2"/>
+          <p:cNvPr id="2" name="Group 2"/>
           <p:cNvGrpSpPr/>
           <p:nvPr/>
         </p:nvGrpSpPr>
         <p:grpSpPr>
-          <a:xfrm rot="0">
+          <a:xfrm>
             <a:off x="2605184" y="2567514"/>
             <a:ext cx="3055911" cy="3337648"/>
             <a:chOff x="0" y="0"/>
@@ -4186,12 +4093,12 @@
         </p:grpSpPr>
         <p:sp>
           <p:nvSpPr>
-            <p:cNvPr name="Freeform 3" id="3"/>
+            <p:cNvPr id="3" name="Freeform 3"/>
             <p:cNvSpPr/>
             <p:nvPr/>
           </p:nvSpPr>
           <p:spPr>
-            <a:xfrm flipH="false" flipV="false" rot="0">
+            <a:xfrm>
               <a:off x="0" y="0"/>
               <a:ext cx="4074547" cy="4074547"/>
             </a:xfrm>
@@ -4200,9 +4107,9 @@
               <a:gdLst/>
               <a:ahLst/>
               <a:cxnLst/>
-              <a:rect r="r" b="b" t="t" l="l"/>
+              <a:rect l="l" t="t" r="r" b="b"/>
               <a:pathLst>
-                <a:path h="4074547" w="4074547">
+                <a:path w="4074547" h="4074547">
                   <a:moveTo>
                     <a:pt x="0" y="0"/>
                   </a:moveTo>
@@ -4231,19 +4138,19 @@
                 </a:extLst>
               </a:blip>
               <a:stretch>
-                <a:fillRect l="0" t="0" r="0" b="0"/>
+                <a:fillRect/>
               </a:stretch>
             </a:blipFill>
           </p:spPr>
         </p:sp>
         <p:sp>
           <p:nvSpPr>
-            <p:cNvPr name="Freeform 4" id="4"/>
+            <p:cNvPr id="4" name="Freeform 4"/>
             <p:cNvSpPr/>
             <p:nvPr/>
           </p:nvSpPr>
           <p:spPr>
-            <a:xfrm flipH="false" flipV="false" rot="0">
+            <a:xfrm>
               <a:off x="165750" y="833479"/>
               <a:ext cx="3743047" cy="3616719"/>
             </a:xfrm>
@@ -4252,9 +4159,9 @@
               <a:gdLst/>
               <a:ahLst/>
               <a:cxnLst/>
-              <a:rect r="r" b="b" t="t" l="l"/>
+              <a:rect l="l" t="t" r="r" b="b"/>
               <a:pathLst>
-                <a:path h="3616719" w="3743047">
+                <a:path w="3743047" h="3616719">
                   <a:moveTo>
                     <a:pt x="0" y="0"/>
                   </a:moveTo>
@@ -4283,7 +4190,7 @@
                 </a:extLst>
               </a:blip>
               <a:stretch>
-                <a:fillRect l="0" t="0" r="0" b="0"/>
+                <a:fillRect/>
               </a:stretch>
             </a:blipFill>
           </p:spPr>
@@ -4291,12 +4198,12 @@
       </p:grpSp>
       <p:sp>
         <p:nvSpPr>
-          <p:cNvPr name="TextBox 5" id="5"/>
-          <p:cNvSpPr txBox="true"/>
+          <p:cNvPr id="5" name="TextBox 5"/>
+          <p:cNvSpPr txBox="1"/>
           <p:nvPr/>
         </p:nvSpPr>
         <p:spPr>
-          <a:xfrm rot="0">
+          <a:xfrm>
             <a:off x="5919525" y="1171575"/>
             <a:ext cx="6448950" cy="708787"/>
           </a:xfrm>
@@ -4305,7 +4212,7 @@
           </a:prstGeom>
         </p:spPr>
         <p:txBody>
-          <a:bodyPr anchor="t" rtlCol="false" tIns="0" lIns="0" bIns="0" rIns="0">
+          <a:bodyPr lIns="0" tIns="0" rIns="0" bIns="0" rtlCol="0" anchor="t">
             <a:spAutoFit/>
           </a:bodyPr>
           <a:lstStyle/>
@@ -4329,12 +4236,12 @@
       </p:sp>
       <p:sp>
         <p:nvSpPr>
-          <p:cNvPr name="TextBox 6" id="6"/>
-          <p:cNvSpPr txBox="true"/>
+          <p:cNvPr id="6" name="TextBox 6"/>
+          <p:cNvSpPr txBox="1"/>
           <p:nvPr/>
         </p:nvSpPr>
         <p:spPr>
-          <a:xfrm rot="0">
+          <a:xfrm>
             <a:off x="5919525" y="1805559"/>
             <a:ext cx="6448950" cy="708787"/>
           </a:xfrm>
@@ -4343,7 +4250,7 @@
           </a:prstGeom>
         </p:spPr>
         <p:txBody>
-          <a:bodyPr anchor="t" rtlCol="false" tIns="0" lIns="0" bIns="0" rIns="0">
+          <a:bodyPr lIns="0" tIns="0" rIns="0" bIns="0" rtlCol="0" anchor="t">
             <a:spAutoFit/>
           </a:bodyPr>
           <a:lstStyle/>
@@ -4367,12 +4274,12 @@
       </p:sp>
       <p:sp>
         <p:nvSpPr>
-          <p:cNvPr name="TextBox 7" id="7"/>
-          <p:cNvSpPr txBox="true"/>
+          <p:cNvPr id="7" name="TextBox 7"/>
+          <p:cNvSpPr txBox="1"/>
           <p:nvPr/>
         </p:nvSpPr>
         <p:spPr>
-          <a:xfrm rot="0">
+          <a:xfrm>
             <a:off x="1627606" y="5957448"/>
             <a:ext cx="5011066" cy="405765"/>
           </a:xfrm>
@@ -4381,7 +4288,7 @@
           </a:prstGeom>
         </p:spPr>
         <p:txBody>
-          <a:bodyPr anchor="t" rtlCol="false" tIns="0" lIns="0" bIns="0" rIns="0">
+          <a:bodyPr lIns="0" tIns="0" rIns="0" bIns="0" rtlCol="0" anchor="t">
             <a:spAutoFit/>
           </a:bodyPr>
           <a:lstStyle/>
@@ -4405,12 +4312,12 @@
       </p:sp>
       <p:sp>
         <p:nvSpPr>
-          <p:cNvPr name="TextBox 8" id="8"/>
-          <p:cNvSpPr txBox="true"/>
+          <p:cNvPr id="8" name="TextBox 8"/>
+          <p:cNvSpPr txBox="1"/>
           <p:nvPr/>
         </p:nvSpPr>
         <p:spPr>
-          <a:xfrm rot="0">
+          <a:xfrm>
             <a:off x="7184503" y="3550246"/>
             <a:ext cx="4863868" cy="405765"/>
           </a:xfrm>
@@ -4419,7 +4326,7 @@
           </a:prstGeom>
         </p:spPr>
         <p:txBody>
-          <a:bodyPr anchor="t" rtlCol="false" tIns="0" lIns="0" bIns="0" rIns="0">
+          <a:bodyPr lIns="0" tIns="0" rIns="0" bIns="0" rtlCol="0" anchor="t">
             <a:spAutoFit/>
           </a:bodyPr>
           <a:lstStyle/>
@@ -4443,12 +4350,12 @@
       </p:sp>
       <p:sp>
         <p:nvSpPr>
-          <p:cNvPr name="TextBox 9" id="9"/>
-          <p:cNvSpPr txBox="true"/>
+          <p:cNvPr id="9" name="TextBox 9"/>
+          <p:cNvSpPr txBox="1"/>
           <p:nvPr/>
         </p:nvSpPr>
         <p:spPr>
-          <a:xfrm rot="0">
+          <a:xfrm>
             <a:off x="12371141" y="6006731"/>
             <a:ext cx="3919404" cy="405765"/>
           </a:xfrm>
@@ -4457,7 +4364,7 @@
           </a:prstGeom>
         </p:spPr>
         <p:txBody>
-          <a:bodyPr anchor="t" rtlCol="false" tIns="0" lIns="0" bIns="0" rIns="0">
+          <a:bodyPr lIns="0" tIns="0" rIns="0" bIns="0" rtlCol="0" anchor="t">
             <a:spAutoFit/>
           </a:bodyPr>
           <a:lstStyle/>
@@ -4481,12 +4388,12 @@
       </p:sp>
       <p:sp>
         <p:nvSpPr>
-          <p:cNvPr name="TextBox 10" id="10"/>
-          <p:cNvSpPr txBox="true"/>
+          <p:cNvPr id="10" name="TextBox 10"/>
+          <p:cNvSpPr txBox="1"/>
           <p:nvPr/>
         </p:nvSpPr>
         <p:spPr>
-          <a:xfrm rot="0">
+          <a:xfrm>
             <a:off x="2173437" y="6415499"/>
             <a:ext cx="3919404" cy="405765"/>
           </a:xfrm>
@@ -4495,7 +4402,7 @@
           </a:prstGeom>
         </p:spPr>
         <p:txBody>
-          <a:bodyPr anchor="t" rtlCol="false" tIns="0" lIns="0" bIns="0" rIns="0">
+          <a:bodyPr lIns="0" tIns="0" rIns="0" bIns="0" rtlCol="0" anchor="t">
             <a:spAutoFit/>
           </a:bodyPr>
           <a:lstStyle/>
@@ -4519,12 +4426,12 @@
       </p:sp>
       <p:sp>
         <p:nvSpPr>
-          <p:cNvPr name="TextBox 11" id="11"/>
-          <p:cNvSpPr txBox="true"/>
+          <p:cNvPr id="11" name="TextBox 11"/>
+          <p:cNvSpPr txBox="1"/>
           <p:nvPr/>
         </p:nvSpPr>
         <p:spPr>
-          <a:xfrm rot="0">
+          <a:xfrm>
             <a:off x="7184503" y="4009643"/>
             <a:ext cx="3919404" cy="405765"/>
           </a:xfrm>
@@ -4533,7 +4440,7 @@
           </a:prstGeom>
         </p:spPr>
         <p:txBody>
-          <a:bodyPr anchor="t" rtlCol="false" tIns="0" lIns="0" bIns="0" rIns="0">
+          <a:bodyPr lIns="0" tIns="0" rIns="0" bIns="0" rtlCol="0" anchor="t">
             <a:spAutoFit/>
           </a:bodyPr>
           <a:lstStyle/>
@@ -4557,12 +4464,12 @@
       </p:sp>
       <p:sp>
         <p:nvSpPr>
-          <p:cNvPr name="TextBox 12" id="12"/>
-          <p:cNvSpPr txBox="true"/>
+          <p:cNvPr id="12" name="TextBox 12"/>
+          <p:cNvSpPr txBox="1"/>
           <p:nvPr/>
         </p:nvSpPr>
         <p:spPr>
-          <a:xfrm rot="0">
+          <a:xfrm>
             <a:off x="12371141" y="6466127"/>
             <a:ext cx="3919404" cy="405765"/>
           </a:xfrm>
@@ -4571,7 +4478,7 @@
           </a:prstGeom>
         </p:spPr>
         <p:txBody>
-          <a:bodyPr anchor="t" rtlCol="false" tIns="0" lIns="0" bIns="0" rIns="0">
+          <a:bodyPr lIns="0" tIns="0" rIns="0" bIns="0" rtlCol="0" anchor="t">
             <a:spAutoFit/>
           </a:bodyPr>
           <a:lstStyle/>
@@ -4595,12 +4502,12 @@
       </p:sp>
       <p:grpSp>
         <p:nvGrpSpPr>
-          <p:cNvPr name="Group 13" id="13"/>
+          <p:cNvPr id="13" name="Group 13"/>
           <p:cNvGrpSpPr/>
           <p:nvPr/>
         </p:nvGrpSpPr>
         <p:grpSpPr>
-          <a:xfrm rot="0">
+          <a:xfrm>
             <a:off x="7488162" y="5790907"/>
             <a:ext cx="3055911" cy="3337648"/>
             <a:chOff x="0" y="0"/>
@@ -4609,12 +4516,12 @@
         </p:grpSpPr>
         <p:sp>
           <p:nvSpPr>
-            <p:cNvPr name="Freeform 14" id="14"/>
+            <p:cNvPr id="14" name="Freeform 14"/>
             <p:cNvSpPr/>
             <p:nvPr/>
           </p:nvSpPr>
           <p:spPr>
-            <a:xfrm flipH="false" flipV="false" rot="0">
+            <a:xfrm>
               <a:off x="0" y="0"/>
               <a:ext cx="4074547" cy="4074547"/>
             </a:xfrm>
@@ -4623,9 +4530,9 @@
               <a:gdLst/>
               <a:ahLst/>
               <a:cxnLst/>
-              <a:rect r="r" b="b" t="t" l="l"/>
+              <a:rect l="l" t="t" r="r" b="b"/>
               <a:pathLst>
-                <a:path h="4074547" w="4074547">
+                <a:path w="4074547" h="4074547">
                   <a:moveTo>
                     <a:pt x="0" y="0"/>
                   </a:moveTo>
@@ -4654,19 +4561,19 @@
                 </a:extLst>
               </a:blip>
               <a:stretch>
-                <a:fillRect l="0" t="0" r="0" b="0"/>
+                <a:fillRect/>
               </a:stretch>
             </a:blipFill>
           </p:spPr>
         </p:sp>
         <p:sp>
           <p:nvSpPr>
-            <p:cNvPr name="Freeform 15" id="15"/>
+            <p:cNvPr id="15" name="Freeform 15"/>
             <p:cNvSpPr/>
             <p:nvPr/>
           </p:nvSpPr>
           <p:spPr>
-            <a:xfrm flipH="false" flipV="false" rot="0">
+            <a:xfrm>
               <a:off x="165750" y="833479"/>
               <a:ext cx="3743047" cy="3616719"/>
             </a:xfrm>
@@ -4675,9 +4582,9 @@
               <a:gdLst/>
               <a:ahLst/>
               <a:cxnLst/>
-              <a:rect r="r" b="b" t="t" l="l"/>
+              <a:rect l="l" t="t" r="r" b="b"/>
               <a:pathLst>
-                <a:path h="3616719" w="3743047">
+                <a:path w="3743047" h="3616719">
                   <a:moveTo>
                     <a:pt x="0" y="0"/>
                   </a:moveTo>
@@ -4706,7 +4613,7 @@
                 </a:extLst>
               </a:blip>
               <a:stretch>
-                <a:fillRect l="0" t="0" r="0" b="0"/>
+                <a:fillRect/>
               </a:stretch>
             </a:blipFill>
           </p:spPr>
@@ -4714,12 +4621,12 @@
       </p:grpSp>
       <p:grpSp>
         <p:nvGrpSpPr>
-          <p:cNvPr name="Group 16" id="16"/>
+          <p:cNvPr id="16" name="Group 16"/>
           <p:cNvGrpSpPr/>
           <p:nvPr/>
         </p:nvGrpSpPr>
         <p:grpSpPr>
-          <a:xfrm rot="0">
+          <a:xfrm>
             <a:off x="12802888" y="2567514"/>
             <a:ext cx="3055911" cy="3337648"/>
             <a:chOff x="0" y="0"/>
@@ -4728,12 +4635,12 @@
         </p:grpSpPr>
         <p:sp>
           <p:nvSpPr>
-            <p:cNvPr name="Freeform 17" id="17"/>
+            <p:cNvPr id="17" name="Freeform 17"/>
             <p:cNvSpPr/>
             <p:nvPr/>
           </p:nvSpPr>
           <p:spPr>
-            <a:xfrm flipH="false" flipV="false" rot="0">
+            <a:xfrm>
               <a:off x="0" y="0"/>
               <a:ext cx="4074547" cy="4074547"/>
             </a:xfrm>
@@ -4742,9 +4649,9 @@
               <a:gdLst/>
               <a:ahLst/>
               <a:cxnLst/>
-              <a:rect r="r" b="b" t="t" l="l"/>
+              <a:rect l="l" t="t" r="r" b="b"/>
               <a:pathLst>
-                <a:path h="4074547" w="4074547">
+                <a:path w="4074547" h="4074547">
                   <a:moveTo>
                     <a:pt x="0" y="0"/>
                   </a:moveTo>
@@ -4773,19 +4680,19 @@
                 </a:extLst>
               </a:blip>
               <a:stretch>
-                <a:fillRect l="0" t="0" r="0" b="0"/>
+                <a:fillRect/>
               </a:stretch>
             </a:blipFill>
           </p:spPr>
         </p:sp>
         <p:sp>
           <p:nvSpPr>
-            <p:cNvPr name="Freeform 18" id="18"/>
+            <p:cNvPr id="18" name="Freeform 18"/>
             <p:cNvSpPr/>
             <p:nvPr/>
           </p:nvSpPr>
           <p:spPr>
-            <a:xfrm flipH="false" flipV="false" rot="0">
+            <a:xfrm>
               <a:off x="165750" y="833479"/>
               <a:ext cx="3743047" cy="3616719"/>
             </a:xfrm>
@@ -4794,9 +4701,9 @@
               <a:gdLst/>
               <a:ahLst/>
               <a:cxnLst/>
-              <a:rect r="r" b="b" t="t" l="l"/>
+              <a:rect l="l" t="t" r="r" b="b"/>
               <a:pathLst>
-                <a:path h="3616719" w="3743047">
+                <a:path w="3743047" h="3616719">
                   <a:moveTo>
                     <a:pt x="0" y="0"/>
                   </a:moveTo>
@@ -4825,7 +4732,7 @@
                 </a:extLst>
               </a:blip>
               <a:stretch>
-                <a:fillRect l="0" t="0" r="0" b="0"/>
+                <a:fillRect/>
               </a:stretch>
             </a:blipFill>
           </p:spPr>
@@ -4840,7 +4747,7 @@
 </file>
 
 <file path=ppt/slides/slide3.xml><?xml version="1.0" encoding="utf-8"?>
-<p:sld xmlns:p="http://schemas.openxmlformats.org/presentationml/2006/main" xmlns:a="http://schemas.openxmlformats.org/drawingml/2006/main" xmlns:r="http://schemas.openxmlformats.org/officeDocument/2006/relationships">
+<p:sld xmlns:a="http://schemas.openxmlformats.org/drawingml/2006/main" xmlns:r="http://schemas.openxmlformats.org/officeDocument/2006/relationships" xmlns:p="http://schemas.openxmlformats.org/presentationml/2006/main">
   <p:cSld>
     <p:spTree>
       <p:nvGrpSpPr>
@@ -4858,12 +4765,12 @@
       </p:grpSpPr>
       <p:grpSp>
         <p:nvGrpSpPr>
-          <p:cNvPr name="Group 2" id="2"/>
+          <p:cNvPr id="2" name="Group 2"/>
           <p:cNvGrpSpPr/>
           <p:nvPr/>
         </p:nvGrpSpPr>
         <p:grpSpPr>
-          <a:xfrm rot="0">
+          <a:xfrm>
             <a:off x="1028700" y="1574847"/>
             <a:ext cx="1856645" cy="68071"/>
             <a:chOff x="0" y="0"/>
@@ -4872,12 +4779,12 @@
         </p:grpSpPr>
         <p:sp>
           <p:nvSpPr>
-            <p:cNvPr name="Freeform 3" id="3"/>
+            <p:cNvPr id="3" name="Freeform 3"/>
             <p:cNvSpPr/>
             <p:nvPr/>
           </p:nvSpPr>
           <p:spPr>
-            <a:xfrm flipH="false" flipV="false" rot="0">
+            <a:xfrm>
               <a:off x="0" y="0"/>
               <a:ext cx="488993" cy="17928"/>
             </a:xfrm>
@@ -4886,9 +4793,9 @@
               <a:gdLst/>
               <a:ahLst/>
               <a:cxnLst/>
-              <a:rect r="r" b="b" t="t" l="l"/>
+              <a:rect l="l" t="t" r="r" b="b"/>
               <a:pathLst>
-                <a:path h="17928" w="488993">
+                <a:path w="488993" h="17928">
                   <a:moveTo>
                     <a:pt x="0" y="0"/>
                   </a:moveTo>
@@ -4912,8 +4819,8 @@
         </p:sp>
         <p:sp>
           <p:nvSpPr>
-            <p:cNvPr name="TextBox 4" id="4"/>
-            <p:cNvSpPr txBox="true"/>
+            <p:cNvPr id="4" name="TextBox 4"/>
+            <p:cNvSpPr txBox="1"/>
             <p:nvPr/>
           </p:nvSpPr>
           <p:spPr>
@@ -4926,7 +4833,7 @@
             </a:prstGeom>
           </p:spPr>
           <p:txBody>
-            <a:bodyPr anchor="ctr" rtlCol="false" tIns="50800" lIns="50800" bIns="50800" rIns="50800"/>
+            <a:bodyPr lIns="50800" tIns="50800" rIns="50800" bIns="50800" rtlCol="0" anchor="ctr"/>
             <a:lstStyle/>
             <a:p>
               <a:pPr algn="ctr">
@@ -4937,18 +4844,19 @@
                   <a:spcPct val="0"/>
                 </a:spcBef>
               </a:pPr>
+              <a:endParaRPr/>
             </a:p>
           </p:txBody>
         </p:sp>
       </p:grpSp>
       <p:sp>
         <p:nvSpPr>
-          <p:cNvPr name="Freeform 5" id="5"/>
+          <p:cNvPr id="5" name="Freeform 5"/>
           <p:cNvSpPr/>
           <p:nvPr/>
         </p:nvSpPr>
         <p:spPr>
-          <a:xfrm flipH="false" flipV="false" rot="0">
+          <a:xfrm>
             <a:off x="4997741" y="1642918"/>
             <a:ext cx="8292519" cy="6534022"/>
           </a:xfrm>
@@ -4957,9 +4865,9 @@
             <a:gdLst/>
             <a:ahLst/>
             <a:cxnLst/>
-            <a:rect r="r" b="b" t="t" l="l"/>
+            <a:rect l="l" t="t" r="r" b="b"/>
             <a:pathLst>
-              <a:path h="6534022" w="8292519">
+              <a:path w="8292519" h="6534022">
                 <a:moveTo>
                   <a:pt x="0" y="0"/>
                 </a:moveTo>
@@ -4982,19 +4890,19 @@
           <a:blipFill>
             <a:blip r:embed="rId2"/>
             <a:stretch>
-              <a:fillRect l="0" t="0" r="0" b="0"/>
+              <a:fillRect/>
             </a:stretch>
           </a:blipFill>
         </p:spPr>
       </p:sp>
       <p:sp>
         <p:nvSpPr>
-          <p:cNvPr name="TextBox 6" id="6"/>
-          <p:cNvSpPr txBox="true"/>
+          <p:cNvPr id="6" name="TextBox 6"/>
+          <p:cNvSpPr txBox="1"/>
           <p:nvPr/>
         </p:nvSpPr>
         <p:spPr>
-          <a:xfrm rot="0">
+          <a:xfrm>
             <a:off x="1028700" y="981075"/>
             <a:ext cx="3489971" cy="405765"/>
           </a:xfrm>
@@ -5003,7 +4911,7 @@
           </a:prstGeom>
         </p:spPr>
         <p:txBody>
-          <a:bodyPr anchor="t" rtlCol="false" tIns="0" lIns="0" bIns="0" rIns="0">
+          <a:bodyPr lIns="0" tIns="0" rIns="0" bIns="0" rtlCol="0" anchor="t">
             <a:spAutoFit/>
           </a:bodyPr>
           <a:lstStyle/>
@@ -5027,12 +4935,12 @@
       </p:sp>
       <p:sp>
         <p:nvSpPr>
-          <p:cNvPr name="TextBox 7" id="7"/>
-          <p:cNvSpPr txBox="true"/>
+          <p:cNvPr id="7" name="TextBox 7"/>
+          <p:cNvSpPr txBox="1"/>
           <p:nvPr/>
         </p:nvSpPr>
         <p:spPr>
-          <a:xfrm rot="0">
+          <a:xfrm>
             <a:off x="702300" y="8367440"/>
             <a:ext cx="16557000" cy="1180465"/>
           </a:xfrm>
@@ -5041,7 +4949,7 @@
           </a:prstGeom>
         </p:spPr>
         <p:txBody>
-          <a:bodyPr anchor="t" rtlCol="false" tIns="0" lIns="0" bIns="0" rIns="0">
+          <a:bodyPr lIns="0" tIns="0" rIns="0" bIns="0" rtlCol="0" anchor="t">
             <a:spAutoFit/>
           </a:bodyPr>
           <a:lstStyle/>
@@ -5072,7 +4980,7 @@
 </file>
 
 <file path=ppt/slides/slide4.xml><?xml version="1.0" encoding="utf-8"?>
-<p:sld xmlns:p="http://schemas.openxmlformats.org/presentationml/2006/main" xmlns:a="http://schemas.openxmlformats.org/drawingml/2006/main" xmlns:r="http://schemas.openxmlformats.org/officeDocument/2006/relationships">
+<p:sld xmlns:a="http://schemas.openxmlformats.org/drawingml/2006/main" xmlns:r="http://schemas.openxmlformats.org/officeDocument/2006/relationships" xmlns:p="http://schemas.openxmlformats.org/presentationml/2006/main">
   <p:cSld>
     <p:spTree>
       <p:nvGrpSpPr>
@@ -5090,12 +4998,12 @@
       </p:grpSpPr>
       <p:grpSp>
         <p:nvGrpSpPr>
-          <p:cNvPr name="Group 2" id="2"/>
+          <p:cNvPr id="2" name="Group 2"/>
           <p:cNvGrpSpPr/>
           <p:nvPr/>
         </p:nvGrpSpPr>
         <p:grpSpPr>
-          <a:xfrm rot="0">
+          <a:xfrm>
             <a:off x="1028700" y="1574847"/>
             <a:ext cx="1856645" cy="68071"/>
             <a:chOff x="0" y="0"/>
@@ -5104,12 +5012,12 @@
         </p:grpSpPr>
         <p:sp>
           <p:nvSpPr>
-            <p:cNvPr name="Freeform 3" id="3"/>
+            <p:cNvPr id="3" name="Freeform 3"/>
             <p:cNvSpPr/>
             <p:nvPr/>
           </p:nvSpPr>
           <p:spPr>
-            <a:xfrm flipH="false" flipV="false" rot="0">
+            <a:xfrm>
               <a:off x="0" y="0"/>
               <a:ext cx="488993" cy="17928"/>
             </a:xfrm>
@@ -5118,9 +5026,9 @@
               <a:gdLst/>
               <a:ahLst/>
               <a:cxnLst/>
-              <a:rect r="r" b="b" t="t" l="l"/>
+              <a:rect l="l" t="t" r="r" b="b"/>
               <a:pathLst>
-                <a:path h="17928" w="488993">
+                <a:path w="488993" h="17928">
                   <a:moveTo>
                     <a:pt x="0" y="0"/>
                   </a:moveTo>
@@ -5144,8 +5052,8 @@
         </p:sp>
         <p:sp>
           <p:nvSpPr>
-            <p:cNvPr name="TextBox 4" id="4"/>
-            <p:cNvSpPr txBox="true"/>
+            <p:cNvPr id="4" name="TextBox 4"/>
+            <p:cNvSpPr txBox="1"/>
             <p:nvPr/>
           </p:nvSpPr>
           <p:spPr>
@@ -5158,7 +5066,7 @@
             </a:prstGeom>
           </p:spPr>
           <p:txBody>
-            <a:bodyPr anchor="ctr" rtlCol="false" tIns="50800" lIns="50800" bIns="50800" rIns="50800"/>
+            <a:bodyPr lIns="50800" tIns="50800" rIns="50800" bIns="50800" rtlCol="0" anchor="ctr"/>
             <a:lstStyle/>
             <a:p>
               <a:pPr algn="ctr">
@@ -5169,18 +5077,19 @@
                   <a:spcPct val="0"/>
                 </a:spcBef>
               </a:pPr>
+              <a:endParaRPr/>
             </a:p>
           </p:txBody>
         </p:sp>
       </p:grpSp>
       <p:sp>
         <p:nvSpPr>
-          <p:cNvPr name="Freeform 5" id="5"/>
+          <p:cNvPr id="5" name="Freeform 5"/>
           <p:cNvSpPr/>
           <p:nvPr/>
         </p:nvSpPr>
         <p:spPr>
-          <a:xfrm flipH="false" flipV="false" rot="0">
+          <a:xfrm>
             <a:off x="5302696" y="1574847"/>
             <a:ext cx="7682609" cy="6619606"/>
           </a:xfrm>
@@ -5189,9 +5098,9 @@
             <a:gdLst/>
             <a:ahLst/>
             <a:cxnLst/>
-            <a:rect r="r" b="b" t="t" l="l"/>
+            <a:rect l="l" t="t" r="r" b="b"/>
             <a:pathLst>
-              <a:path h="6619606" w="7682609">
+              <a:path w="7682609" h="6619606">
                 <a:moveTo>
                   <a:pt x="0" y="0"/>
                 </a:moveTo>
@@ -5214,19 +5123,19 @@
           <a:blipFill>
             <a:blip r:embed="rId2"/>
             <a:stretch>
-              <a:fillRect l="0" t="0" r="0" b="0"/>
+              <a:fillRect/>
             </a:stretch>
           </a:blipFill>
         </p:spPr>
       </p:sp>
       <p:sp>
         <p:nvSpPr>
-          <p:cNvPr name="TextBox 6" id="6"/>
-          <p:cNvSpPr txBox="true"/>
+          <p:cNvPr id="6" name="TextBox 6"/>
+          <p:cNvSpPr txBox="1"/>
           <p:nvPr/>
         </p:nvSpPr>
         <p:spPr>
-          <a:xfrm rot="0">
+          <a:xfrm>
             <a:off x="1028700" y="981075"/>
             <a:ext cx="3489971" cy="405765"/>
           </a:xfrm>
@@ -5235,7 +5144,7 @@
           </a:prstGeom>
         </p:spPr>
         <p:txBody>
-          <a:bodyPr anchor="t" rtlCol="false" tIns="0" lIns="0" bIns="0" rIns="0">
+          <a:bodyPr lIns="0" tIns="0" rIns="0" bIns="0" rtlCol="0" anchor="t">
             <a:spAutoFit/>
           </a:bodyPr>
           <a:lstStyle/>
@@ -5259,12 +5168,12 @@
       </p:sp>
       <p:sp>
         <p:nvSpPr>
-          <p:cNvPr name="TextBox 7" id="7"/>
-          <p:cNvSpPr txBox="true"/>
+          <p:cNvPr id="7" name="TextBox 7"/>
+          <p:cNvSpPr txBox="1"/>
           <p:nvPr/>
         </p:nvSpPr>
         <p:spPr>
-          <a:xfrm rot="0">
+          <a:xfrm>
             <a:off x="702300" y="8367440"/>
             <a:ext cx="16557000" cy="1780540"/>
           </a:xfrm>
@@ -5273,7 +5182,7 @@
           </a:prstGeom>
         </p:spPr>
         <p:txBody>
-          <a:bodyPr anchor="t" rtlCol="false" tIns="0" lIns="0" bIns="0" rIns="0">
+          <a:bodyPr lIns="0" tIns="0" rIns="0" bIns="0" rtlCol="0" anchor="t">
             <a:spAutoFit/>
           </a:bodyPr>
           <a:lstStyle/>
@@ -5304,7 +5213,7 @@
 </file>
 
 <file path=ppt/slides/slide5.xml><?xml version="1.0" encoding="utf-8"?>
-<p:sld xmlns:p="http://schemas.openxmlformats.org/presentationml/2006/main" xmlns:a="http://schemas.openxmlformats.org/drawingml/2006/main" xmlns:r="http://schemas.openxmlformats.org/officeDocument/2006/relationships">
+<p:sld xmlns:a="http://schemas.openxmlformats.org/drawingml/2006/main" xmlns:r="http://schemas.openxmlformats.org/officeDocument/2006/relationships" xmlns:p="http://schemas.openxmlformats.org/presentationml/2006/main">
   <p:cSld>
     <p:spTree>
       <p:nvGrpSpPr>
@@ -5322,12 +5231,12 @@
       </p:grpSpPr>
       <p:sp>
         <p:nvSpPr>
-          <p:cNvPr name="Freeform 2" id="2"/>
+          <p:cNvPr id="2" name="Freeform 2"/>
           <p:cNvSpPr/>
           <p:nvPr/>
         </p:nvSpPr>
         <p:spPr>
-          <a:xfrm flipH="false" flipV="false" rot="0">
+          <a:xfrm>
             <a:off x="3162429" y="2887920"/>
             <a:ext cx="11963142" cy="4511161"/>
           </a:xfrm>
@@ -5336,9 +5245,9 @@
             <a:gdLst/>
             <a:ahLst/>
             <a:cxnLst/>
-            <a:rect r="r" b="b" t="t" l="l"/>
+            <a:rect l="l" t="t" r="r" b="b"/>
             <a:pathLst>
-              <a:path h="4511161" w="11963142">
+              <a:path w="11963142" h="4511161">
                 <a:moveTo>
                   <a:pt x="0" y="0"/>
                 </a:moveTo>
@@ -5361,7 +5270,7 @@
           <a:blipFill>
             <a:blip r:embed="rId2"/>
             <a:stretch>
-              <a:fillRect l="0" t="0" r="0" b="0"/>
+              <a:fillRect/>
             </a:stretch>
           </a:blipFill>
         </p:spPr>
@@ -5375,7 +5284,7 @@
 </file>
 
 <file path=ppt/slides/slide6.xml><?xml version="1.0" encoding="utf-8"?>
-<p:sld xmlns:p="http://schemas.openxmlformats.org/presentationml/2006/main" xmlns:a="http://schemas.openxmlformats.org/drawingml/2006/main" xmlns:r="http://schemas.openxmlformats.org/officeDocument/2006/relationships">
+<p:sld xmlns:a="http://schemas.openxmlformats.org/drawingml/2006/main" xmlns:r="http://schemas.openxmlformats.org/officeDocument/2006/relationships" xmlns:p="http://schemas.openxmlformats.org/presentationml/2006/main">
   <p:cSld>
     <p:spTree>
       <p:nvGrpSpPr>
@@ -5393,12 +5302,12 @@
       </p:grpSpPr>
       <p:sp>
         <p:nvSpPr>
-          <p:cNvPr name="Freeform 2" id="2"/>
+          <p:cNvPr id="2" name="Freeform 2"/>
           <p:cNvSpPr/>
           <p:nvPr/>
         </p:nvSpPr>
         <p:spPr>
-          <a:xfrm flipH="false" flipV="false" rot="0">
+          <a:xfrm>
             <a:off x="4736117" y="1028700"/>
             <a:ext cx="8815766" cy="6483023"/>
           </a:xfrm>
@@ -5407,9 +5316,9 @@
             <a:gdLst/>
             <a:ahLst/>
             <a:cxnLst/>
-            <a:rect r="r" b="b" t="t" l="l"/>
+            <a:rect l="l" t="t" r="r" b="b"/>
             <a:pathLst>
-              <a:path h="6483023" w="8815766">
+              <a:path w="8815766" h="6483023">
                 <a:moveTo>
                   <a:pt x="0" y="0"/>
                 </a:moveTo>
@@ -5432,19 +5341,19 @@
           <a:blipFill>
             <a:blip r:embed="rId2"/>
             <a:stretch>
-              <a:fillRect l="0" t="0" r="0" b="0"/>
+              <a:fillRect/>
             </a:stretch>
           </a:blipFill>
         </p:spPr>
       </p:sp>
       <p:sp>
         <p:nvSpPr>
-          <p:cNvPr name="TextBox 3" id="3"/>
-          <p:cNvSpPr txBox="true"/>
+          <p:cNvPr id="3" name="TextBox 3"/>
+          <p:cNvSpPr txBox="1"/>
           <p:nvPr/>
         </p:nvSpPr>
         <p:spPr>
-          <a:xfrm rot="0">
+          <a:xfrm>
             <a:off x="702300" y="8367440"/>
             <a:ext cx="16557000" cy="1180465"/>
           </a:xfrm>
@@ -5453,7 +5362,7 @@
           </a:prstGeom>
         </p:spPr>
         <p:txBody>
-          <a:bodyPr anchor="t" rtlCol="false" tIns="0" lIns="0" bIns="0" rIns="0">
+          <a:bodyPr lIns="0" tIns="0" rIns="0" bIns="0" rtlCol="0" anchor="t">
             <a:spAutoFit/>
           </a:bodyPr>
           <a:lstStyle/>
@@ -5484,7 +5393,7 @@
 </file>
 
 <file path=ppt/slides/slide7.xml><?xml version="1.0" encoding="utf-8"?>
-<p:sld xmlns:p="http://schemas.openxmlformats.org/presentationml/2006/main" xmlns:a="http://schemas.openxmlformats.org/drawingml/2006/main" xmlns:r="http://schemas.openxmlformats.org/officeDocument/2006/relationships">
+<p:sld xmlns:a="http://schemas.openxmlformats.org/drawingml/2006/main" xmlns:r="http://schemas.openxmlformats.org/officeDocument/2006/relationships" xmlns:p="http://schemas.openxmlformats.org/presentationml/2006/main">
   <p:cSld>
     <p:spTree>
       <p:nvGrpSpPr>
@@ -5502,12 +5411,12 @@
       </p:grpSpPr>
       <p:sp>
         <p:nvSpPr>
-          <p:cNvPr name="Freeform 2" id="2"/>
+          <p:cNvPr id="2" name="Freeform 2"/>
           <p:cNvSpPr/>
           <p:nvPr/>
         </p:nvSpPr>
         <p:spPr>
-          <a:xfrm flipH="false" flipV="false" rot="0">
+          <a:xfrm>
             <a:off x="5125686" y="1028700"/>
             <a:ext cx="8036629" cy="6536073"/>
           </a:xfrm>
@@ -5516,9 +5425,9 @@
             <a:gdLst/>
             <a:ahLst/>
             <a:cxnLst/>
-            <a:rect r="r" b="b" t="t" l="l"/>
+            <a:rect l="l" t="t" r="r" b="b"/>
             <a:pathLst>
-              <a:path h="6536073" w="8036629">
+              <a:path w="8036629" h="6536073">
                 <a:moveTo>
                   <a:pt x="0" y="0"/>
                 </a:moveTo>
@@ -5541,19 +5450,19 @@
           <a:blipFill>
             <a:blip r:embed="rId2"/>
             <a:stretch>
-              <a:fillRect l="0" t="0" r="0" b="0"/>
+              <a:fillRect/>
             </a:stretch>
           </a:blipFill>
         </p:spPr>
       </p:sp>
       <p:sp>
         <p:nvSpPr>
-          <p:cNvPr name="TextBox 3" id="3"/>
-          <p:cNvSpPr txBox="true"/>
+          <p:cNvPr id="3" name="TextBox 3"/>
+          <p:cNvSpPr txBox="1"/>
           <p:nvPr/>
         </p:nvSpPr>
         <p:spPr>
-          <a:xfrm rot="0">
+          <a:xfrm>
             <a:off x="702300" y="8367440"/>
             <a:ext cx="16557000" cy="1180465"/>
           </a:xfrm>
@@ -5562,7 +5471,7 @@
           </a:prstGeom>
         </p:spPr>
         <p:txBody>
-          <a:bodyPr anchor="t" rtlCol="false" tIns="0" lIns="0" bIns="0" rIns="0">
+          <a:bodyPr lIns="0" tIns="0" rIns="0" bIns="0" rtlCol="0" anchor="t">
             <a:spAutoFit/>
           </a:bodyPr>
           <a:lstStyle/>
@@ -5593,7 +5502,7 @@
 </file>
 
 <file path=ppt/slides/slide8.xml><?xml version="1.0" encoding="utf-8"?>
-<p:sld xmlns:p="http://schemas.openxmlformats.org/presentationml/2006/main" xmlns:a="http://schemas.openxmlformats.org/drawingml/2006/main" xmlns:r="http://schemas.openxmlformats.org/officeDocument/2006/relationships">
+<p:sld xmlns:a="http://schemas.openxmlformats.org/drawingml/2006/main" xmlns:r="http://schemas.openxmlformats.org/officeDocument/2006/relationships" xmlns:p="http://schemas.openxmlformats.org/presentationml/2006/main">
   <p:cSld>
     <p:spTree>
       <p:nvGrpSpPr>
@@ -5611,12 +5520,12 @@
       </p:grpSpPr>
       <p:sp>
         <p:nvSpPr>
-          <p:cNvPr name="Freeform 2" id="2"/>
+          <p:cNvPr id="2" name="Freeform 2"/>
           <p:cNvSpPr/>
           <p:nvPr/>
         </p:nvSpPr>
         <p:spPr>
-          <a:xfrm flipH="false" flipV="false" rot="0">
+          <a:xfrm>
             <a:off x="13420651" y="4327954"/>
             <a:ext cx="4612089" cy="3866115"/>
           </a:xfrm>
@@ -5625,9 +5534,9 @@
             <a:gdLst/>
             <a:ahLst/>
             <a:cxnLst/>
-            <a:rect r="r" b="b" t="t" l="l"/>
+            <a:rect l="l" t="t" r="r" b="b"/>
             <a:pathLst>
-              <a:path h="3866115" w="4612089">
+              <a:path w="4612089" h="3866115">
                 <a:moveTo>
                   <a:pt x="0" y="0"/>
                 </a:moveTo>
@@ -5650,19 +5559,19 @@
           <a:blipFill>
             <a:blip r:embed="rId2"/>
             <a:stretch>
-              <a:fillRect l="-4340" t="0" r="-5534" b="0"/>
+              <a:fillRect l="-4340" r="-5534"/>
             </a:stretch>
           </a:blipFill>
         </p:spPr>
       </p:sp>
       <p:sp>
         <p:nvSpPr>
-          <p:cNvPr name="Freeform 3" id="3"/>
+          <p:cNvPr id="3" name="Freeform 3"/>
           <p:cNvSpPr/>
           <p:nvPr/>
         </p:nvSpPr>
         <p:spPr>
-          <a:xfrm flipH="false" flipV="false" rot="0">
+          <a:xfrm>
             <a:off x="9144000" y="4563328"/>
             <a:ext cx="4059051" cy="3395368"/>
           </a:xfrm>
@@ -5671,9 +5580,9 @@
             <a:gdLst/>
             <a:ahLst/>
             <a:cxnLst/>
-            <a:rect r="r" b="b" t="t" l="l"/>
+            <a:rect l="l" t="t" r="r" b="b"/>
             <a:pathLst>
-              <a:path h="3395368" w="4059051">
+              <a:path w="4059051" h="3395368">
                 <a:moveTo>
                   <a:pt x="0" y="0"/>
                 </a:moveTo>
@@ -5696,19 +5605,19 @@
           <a:blipFill>
             <a:blip r:embed="rId3"/>
             <a:stretch>
-              <a:fillRect l="0" t="0" r="0" b="0"/>
+              <a:fillRect/>
             </a:stretch>
           </a:blipFill>
         </p:spPr>
       </p:sp>
       <p:sp>
         <p:nvSpPr>
-          <p:cNvPr name="Freeform 4" id="4"/>
+          <p:cNvPr id="4" name="Freeform 4"/>
           <p:cNvSpPr/>
           <p:nvPr/>
         </p:nvSpPr>
         <p:spPr>
-          <a:xfrm flipH="false" flipV="false" rot="0">
+          <a:xfrm>
             <a:off x="4797608" y="4402366"/>
             <a:ext cx="4123281" cy="3556330"/>
           </a:xfrm>
@@ -5717,9 +5626,9 @@
             <a:gdLst/>
             <a:ahLst/>
             <a:cxnLst/>
-            <a:rect r="r" b="b" t="t" l="l"/>
+            <a:rect l="l" t="t" r="r" b="b"/>
             <a:pathLst>
-              <a:path h="3556330" w="4123281">
+              <a:path w="4123281" h="3556330">
                 <a:moveTo>
                   <a:pt x="0" y="0"/>
                 </a:moveTo>
@@ -5742,19 +5651,19 @@
           <a:blipFill>
             <a:blip r:embed="rId4"/>
             <a:stretch>
-              <a:fillRect l="0" t="0" r="0" b="0"/>
+              <a:fillRect/>
             </a:stretch>
           </a:blipFill>
         </p:spPr>
       </p:sp>
       <p:sp>
         <p:nvSpPr>
-          <p:cNvPr name="Freeform 5" id="5"/>
+          <p:cNvPr id="5" name="Freeform 5"/>
           <p:cNvSpPr/>
           <p:nvPr/>
         </p:nvSpPr>
         <p:spPr>
-          <a:xfrm flipH="false" flipV="false" rot="0">
+          <a:xfrm>
             <a:off x="822428" y="4705290"/>
             <a:ext cx="3619433" cy="3111443"/>
           </a:xfrm>
@@ -5763,9 +5672,9 @@
             <a:gdLst/>
             <a:ahLst/>
             <a:cxnLst/>
-            <a:rect r="r" b="b" t="t" l="l"/>
+            <a:rect l="l" t="t" r="r" b="b"/>
             <a:pathLst>
-              <a:path h="3111443" w="3619433">
+              <a:path w="3619433" h="3111443">
                 <a:moveTo>
                   <a:pt x="0" y="0"/>
                 </a:moveTo>
@@ -5788,19 +5697,19 @@
           <a:blipFill>
             <a:blip r:embed="rId5"/>
             <a:stretch>
-              <a:fillRect l="0" t="0" r="0" b="0"/>
+              <a:fillRect/>
             </a:stretch>
           </a:blipFill>
         </p:spPr>
       </p:sp>
       <p:sp>
         <p:nvSpPr>
-          <p:cNvPr name="Freeform 6" id="6"/>
+          <p:cNvPr id="6" name="Freeform 6"/>
           <p:cNvSpPr/>
           <p:nvPr/>
         </p:nvSpPr>
         <p:spPr>
-          <a:xfrm flipH="false" flipV="false" rot="0">
+          <a:xfrm>
             <a:off x="7631685" y="1503828"/>
             <a:ext cx="7348952" cy="2322212"/>
           </a:xfrm>
@@ -5809,9 +5718,9 @@
             <a:gdLst/>
             <a:ahLst/>
             <a:cxnLst/>
-            <a:rect r="r" b="b" t="t" l="l"/>
+            <a:rect l="l" t="t" r="r" b="b"/>
             <a:pathLst>
-              <a:path h="2322212" w="7348952">
+              <a:path w="7348952" h="2322212">
                 <a:moveTo>
                   <a:pt x="0" y="0"/>
                 </a:moveTo>
@@ -5834,19 +5743,19 @@
           <a:blipFill>
             <a:blip r:embed="rId6"/>
             <a:stretch>
-              <a:fillRect l="0" t="0" r="0" b="0"/>
+              <a:fillRect/>
             </a:stretch>
           </a:blipFill>
         </p:spPr>
       </p:sp>
       <p:sp>
         <p:nvSpPr>
-          <p:cNvPr name="Freeform 7" id="7"/>
+          <p:cNvPr id="7" name="Freeform 7"/>
           <p:cNvSpPr/>
           <p:nvPr/>
         </p:nvSpPr>
         <p:spPr>
-          <a:xfrm flipH="false" flipV="false" rot="0">
+          <a:xfrm>
             <a:off x="2126320" y="1028700"/>
             <a:ext cx="5003710" cy="3272469"/>
           </a:xfrm>
@@ -5855,9 +5764,9 @@
             <a:gdLst/>
             <a:ahLst/>
             <a:cxnLst/>
-            <a:rect r="r" b="b" t="t" l="l"/>
+            <a:rect l="l" t="t" r="r" b="b"/>
             <a:pathLst>
-              <a:path h="3272469" w="5003710">
+              <a:path w="5003710" h="3272469">
                 <a:moveTo>
                   <a:pt x="0" y="0"/>
                 </a:moveTo>
@@ -5880,19 +5789,19 @@
           <a:blipFill>
             <a:blip r:embed="rId7"/>
             <a:stretch>
-              <a:fillRect l="0" t="0" r="0" b="0"/>
+              <a:fillRect/>
             </a:stretch>
           </a:blipFill>
         </p:spPr>
       </p:sp>
       <p:sp>
         <p:nvSpPr>
-          <p:cNvPr name="TextBox 8" id="8"/>
-          <p:cNvSpPr txBox="true"/>
+          <p:cNvPr id="8" name="TextBox 8"/>
+          <p:cNvSpPr txBox="1"/>
           <p:nvPr/>
         </p:nvSpPr>
         <p:spPr>
-          <a:xfrm rot="0">
+          <a:xfrm>
             <a:off x="702300" y="8367440"/>
             <a:ext cx="16557000" cy="1180465"/>
           </a:xfrm>
@@ -5901,7 +5810,7 @@
           </a:prstGeom>
         </p:spPr>
         <p:txBody>
-          <a:bodyPr anchor="t" rtlCol="false" tIns="0" lIns="0" bIns="0" rIns="0">
+          <a:bodyPr lIns="0" tIns="0" rIns="0" bIns="0" rtlCol="0" anchor="t">
             <a:spAutoFit/>
           </a:bodyPr>
           <a:lstStyle/>
@@ -5932,7 +5841,7 @@
 </file>
 
 <file path=ppt/slides/slide9.xml><?xml version="1.0" encoding="utf-8"?>
-<p:sld xmlns:p="http://schemas.openxmlformats.org/presentationml/2006/main" xmlns:a="http://schemas.openxmlformats.org/drawingml/2006/main" xmlns:r="http://schemas.openxmlformats.org/officeDocument/2006/relationships">
+<p:sld xmlns:a="http://schemas.openxmlformats.org/drawingml/2006/main" xmlns:r="http://schemas.openxmlformats.org/officeDocument/2006/relationships" xmlns:p="http://schemas.openxmlformats.org/presentationml/2006/main">
   <p:cSld>
     <p:spTree>
       <p:nvGrpSpPr>
@@ -5950,12 +5859,12 @@
       </p:grpSpPr>
       <p:sp>
         <p:nvSpPr>
-          <p:cNvPr name="Freeform 2" id="2"/>
+          <p:cNvPr id="2" name="Freeform 2"/>
           <p:cNvSpPr/>
           <p:nvPr/>
         </p:nvSpPr>
         <p:spPr>
-          <a:xfrm flipH="false" flipV="false" rot="0">
+          <a:xfrm>
             <a:off x="3512254" y="1028700"/>
             <a:ext cx="11263493" cy="7404890"/>
           </a:xfrm>
@@ -5964,9 +5873,9 @@
             <a:gdLst/>
             <a:ahLst/>
             <a:cxnLst/>
-            <a:rect r="r" b="b" t="t" l="l"/>
+            <a:rect l="l" t="t" r="r" b="b"/>
             <a:pathLst>
-              <a:path h="7404890" w="11263493">
+              <a:path w="11263493" h="7404890">
                 <a:moveTo>
                   <a:pt x="0" y="0"/>
                 </a:moveTo>
@@ -5989,19 +5898,19 @@
           <a:blipFill>
             <a:blip r:embed="rId2"/>
             <a:stretch>
-              <a:fillRect l="0" t="0" r="0" b="0"/>
+              <a:fillRect/>
             </a:stretch>
           </a:blipFill>
         </p:spPr>
       </p:sp>
       <p:sp>
         <p:nvSpPr>
-          <p:cNvPr name="TextBox 3" id="3"/>
-          <p:cNvSpPr txBox="true"/>
+          <p:cNvPr id="3" name="TextBox 3"/>
+          <p:cNvSpPr txBox="1"/>
           <p:nvPr/>
         </p:nvSpPr>
         <p:spPr>
-          <a:xfrm rot="0">
+          <a:xfrm>
             <a:off x="702300" y="8367440"/>
             <a:ext cx="16557000" cy="1180465"/>
           </a:xfrm>
@@ -6010,7 +5919,7 @@
           </a:prstGeom>
         </p:spPr>
         <p:txBody>
-          <a:bodyPr anchor="t" rtlCol="false" tIns="0" lIns="0" bIns="0" rIns="0">
+          <a:bodyPr lIns="0" tIns="0" rIns="0" bIns="0" rtlCol="0" anchor="t">
             <a:spAutoFit/>
           </a:bodyPr>
           <a:lstStyle/>

</xml_diff>